<commit_message>
Presentation for BSides Bournemouth 2025
</commit_message>
<xml_diff>
--- a/BSides Bournemouth 2025/BSides_Bournemouth_2025.pptx
+++ b/BSides Bournemouth 2025/BSides_Bournemouth_2025.pptx
@@ -5,7 +5,7 @@
     <p:sldMasterId id="2147483732" r:id="rId3"/>
   </p:sldMasterIdLst>
   <p:notesMasterIdLst>
-    <p:notesMasterId r:id="rId24"/>
+    <p:notesMasterId r:id="rId26"/>
   </p:notesMasterIdLst>
   <p:sldIdLst>
     <p:sldId id="256" r:id="rId4"/>
@@ -17,17 +17,19 @@
     <p:sldId id="280" r:id="rId10"/>
     <p:sldId id="268" r:id="rId11"/>
     <p:sldId id="278" r:id="rId12"/>
-    <p:sldId id="273" r:id="rId13"/>
-    <p:sldId id="274" r:id="rId14"/>
-    <p:sldId id="277" r:id="rId15"/>
-    <p:sldId id="276" r:id="rId16"/>
-    <p:sldId id="282" r:id="rId17"/>
-    <p:sldId id="263" r:id="rId18"/>
-    <p:sldId id="279" r:id="rId19"/>
-    <p:sldId id="281" r:id="rId20"/>
-    <p:sldId id="270" r:id="rId21"/>
-    <p:sldId id="264" r:id="rId22"/>
-    <p:sldId id="284" r:id="rId23"/>
+    <p:sldId id="285" r:id="rId13"/>
+    <p:sldId id="273" r:id="rId14"/>
+    <p:sldId id="274" r:id="rId15"/>
+    <p:sldId id="277" r:id="rId16"/>
+    <p:sldId id="286" r:id="rId17"/>
+    <p:sldId id="276" r:id="rId18"/>
+    <p:sldId id="282" r:id="rId19"/>
+    <p:sldId id="263" r:id="rId20"/>
+    <p:sldId id="279" r:id="rId21"/>
+    <p:sldId id="281" r:id="rId22"/>
+    <p:sldId id="270" r:id="rId23"/>
+    <p:sldId id="264" r:id="rId24"/>
+    <p:sldId id="284" r:id="rId25"/>
   </p:sldIdLst>
   <p:sldSz cx="12192000" cy="6858000"/>
   <p:notesSz cx="6858000" cy="9144000"/>
@@ -31469,7 +31471,7 @@
           <a:p>
             <a:fld id="{F46AF6B3-34F1-4288-80A3-EB1763D727A9}" type="slidenum">
               <a:rPr lang="en-GB" smtClean="0"/>
-              <a:t>15</a:t>
+              <a:t>17</a:t>
             </a:fld>
             <a:endParaRPr lang="en-GB"/>
           </a:p>
@@ -31577,7 +31579,7 @@
           <a:p>
             <a:fld id="{F46AF6B3-34F1-4288-80A3-EB1763D727A9}" type="slidenum">
               <a:rPr lang="en-GB" smtClean="0"/>
-              <a:t>17</a:t>
+              <a:t>19</a:t>
             </a:fld>
             <a:endParaRPr lang="en-GB"/>
           </a:p>
@@ -31674,7 +31676,7 @@
           <a:p>
             <a:fld id="{F46AF6B3-34F1-4288-80A3-EB1763D727A9}" type="slidenum">
               <a:rPr lang="en-GB" smtClean="0"/>
-              <a:t>18</a:t>
+              <a:t>20</a:t>
             </a:fld>
             <a:endParaRPr lang="en-GB"/>
           </a:p>
@@ -31782,7 +31784,7 @@
           <a:p>
             <a:fld id="{F46AF6B3-34F1-4288-80A3-EB1763D727A9}" type="slidenum">
               <a:rPr lang="en-GB" smtClean="0"/>
-              <a:t>19</a:t>
+              <a:t>21</a:t>
             </a:fld>
             <a:endParaRPr lang="en-GB"/>
           </a:p>
@@ -31866,7 +31868,7 @@
           <a:p>
             <a:fld id="{F46AF6B3-34F1-4288-80A3-EB1763D727A9}" type="slidenum">
               <a:rPr lang="en-GB" smtClean="0"/>
-              <a:t>20</a:t>
+              <a:t>22</a:t>
             </a:fld>
             <a:endParaRPr lang="en-GB"/>
           </a:p>
@@ -32541,7 +32543,7 @@
           <a:p>
             <a:fld id="{F46AF6B3-34F1-4288-80A3-EB1763D727A9}" type="slidenum">
               <a:rPr lang="en-GB" smtClean="0"/>
-              <a:t>11</a:t>
+              <a:t>12</a:t>
             </a:fld>
             <a:endParaRPr lang="en-GB"/>
           </a:p>
@@ -32683,7 +32685,7 @@
           <a:p>
             <a:fld id="{F46AF6B3-34F1-4288-80A3-EB1763D727A9}" type="slidenum">
               <a:rPr lang="en-GB" smtClean="0"/>
-              <a:t>12</a:t>
+              <a:t>13</a:t>
             </a:fld>
             <a:endParaRPr lang="en-GB"/>
           </a:p>
@@ -32825,7 +32827,7 @@
           <a:p>
             <a:fld id="{F46AF6B3-34F1-4288-80A3-EB1763D727A9}" type="slidenum">
               <a:rPr lang="en-GB" smtClean="0"/>
-              <a:t>13</a:t>
+              <a:t>15</a:t>
             </a:fld>
             <a:endParaRPr lang="en-GB"/>
           </a:p>
@@ -32909,7 +32911,7 @@
           <a:p>
             <a:fld id="{F46AF6B3-34F1-4288-80A3-EB1763D727A9}" type="slidenum">
               <a:rPr lang="en-GB" smtClean="0"/>
-              <a:t>14</a:t>
+              <a:t>16</a:t>
             </a:fld>
             <a:endParaRPr lang="en-GB"/>
           </a:p>
@@ -37036,6 +37038,1186 @@
 <file path=ppt/slides/slide10.xml><?xml version="1.0" encoding="utf-8"?>
 <p:sld xmlns:a="http://schemas.openxmlformats.org/drawingml/2006/main" xmlns:r="http://schemas.openxmlformats.org/officeDocument/2006/relationships" xmlns:p="http://schemas.openxmlformats.org/presentationml/2006/main">
   <p:cSld>
+    <p:spTree>
+      <p:nvGrpSpPr>
+        <p:cNvPr id="1" name=""/>
+        <p:cNvGrpSpPr/>
+        <p:nvPr/>
+      </p:nvGrpSpPr>
+      <p:grpSpPr>
+        <a:xfrm>
+          <a:off x="0" y="0"/>
+          <a:ext cx="0" cy="0"/>
+          <a:chOff x="0" y="0"/>
+          <a:chExt cx="0" cy="0"/>
+        </a:xfrm>
+      </p:grpSpPr>
+      <p:sp>
+        <p:nvSpPr>
+          <p:cNvPr id="2" name="Title 1">
+            <a:extLst>
+              <a:ext uri="{FF2B5EF4-FFF2-40B4-BE49-F238E27FC236}">
+                <a16:creationId xmlns:a16="http://schemas.microsoft.com/office/drawing/2014/main" id="{BF38555A-1794-3934-D698-B1D915E28A0C}"/>
+              </a:ext>
+            </a:extLst>
+          </p:cNvPr>
+          <p:cNvSpPr>
+            <a:spLocks noGrp="1"/>
+          </p:cNvSpPr>
+          <p:nvPr>
+            <p:ph type="title"/>
+          </p:nvPr>
+        </p:nvSpPr>
+        <p:spPr/>
+        <p:txBody>
+          <a:bodyPr/>
+          <a:lstStyle/>
+          <a:p>
+            <a:r>
+              <a:rPr lang="en-GB"/>
+              <a:t>Data Flow Diagram</a:t>
+            </a:r>
+          </a:p>
+        </p:txBody>
+      </p:sp>
+      <p:sp>
+        <p:nvSpPr>
+          <p:cNvPr id="4" name="Date Placeholder 3">
+            <a:extLst>
+              <a:ext uri="{FF2B5EF4-FFF2-40B4-BE49-F238E27FC236}">
+                <a16:creationId xmlns:a16="http://schemas.microsoft.com/office/drawing/2014/main" id="{7D853BC5-0709-659E-8595-487408C398B5}"/>
+              </a:ext>
+            </a:extLst>
+          </p:cNvPr>
+          <p:cNvSpPr>
+            <a:spLocks noGrp="1"/>
+          </p:cNvSpPr>
+          <p:nvPr>
+            <p:ph type="dt" sz="half" idx="10"/>
+          </p:nvPr>
+        </p:nvSpPr>
+        <p:spPr/>
+        <p:txBody>
+          <a:bodyPr/>
+          <a:lstStyle/>
+          <a:p>
+            <a:r>
+              <a:rPr lang="en-GB"/>
+              <a:t>11/07/2025</a:t>
+            </a:r>
+            <a:endParaRPr lang="en-US"/>
+          </a:p>
+        </p:txBody>
+      </p:sp>
+      <p:sp>
+        <p:nvSpPr>
+          <p:cNvPr id="5" name="Footer Placeholder 4">
+            <a:extLst>
+              <a:ext uri="{FF2B5EF4-FFF2-40B4-BE49-F238E27FC236}">
+                <a16:creationId xmlns:a16="http://schemas.microsoft.com/office/drawing/2014/main" id="{BAAFD06F-513B-878D-2D7A-66FF905FA704}"/>
+              </a:ext>
+            </a:extLst>
+          </p:cNvPr>
+          <p:cNvSpPr>
+            <a:spLocks noGrp="1"/>
+          </p:cNvSpPr>
+          <p:nvPr>
+            <p:ph type="ftr" sz="quarter" idx="11"/>
+          </p:nvPr>
+        </p:nvSpPr>
+        <p:spPr/>
+        <p:txBody>
+          <a:bodyPr/>
+          <a:lstStyle/>
+          <a:p>
+            <a:r>
+              <a:rPr lang="en-US"/>
+              <a:t>SteelCon 2025</a:t>
+            </a:r>
+          </a:p>
+        </p:txBody>
+      </p:sp>
+      <p:sp>
+        <p:nvSpPr>
+          <p:cNvPr id="6" name="Slide Number Placeholder 5">
+            <a:extLst>
+              <a:ext uri="{FF2B5EF4-FFF2-40B4-BE49-F238E27FC236}">
+                <a16:creationId xmlns:a16="http://schemas.microsoft.com/office/drawing/2014/main" id="{039B19DC-7607-D7F1-8188-3FBE069610FC}"/>
+              </a:ext>
+            </a:extLst>
+          </p:cNvPr>
+          <p:cNvSpPr>
+            <a:spLocks noGrp="1"/>
+          </p:cNvSpPr>
+          <p:nvPr>
+            <p:ph type="sldNum" sz="quarter" idx="12"/>
+          </p:nvPr>
+        </p:nvSpPr>
+        <p:spPr/>
+        <p:txBody>
+          <a:bodyPr/>
+          <a:lstStyle/>
+          <a:p>
+            <a:fld id="{A65A5C87-DF58-40C8-B092-1DE63DB4547E}" type="slidenum">
+              <a:rPr lang="en-US" dirty="0"/>
+              <a:t>10</a:t>
+            </a:fld>
+            <a:endParaRPr lang="en-US"/>
+          </a:p>
+        </p:txBody>
+      </p:sp>
+      <p:sp>
+        <p:nvSpPr>
+          <p:cNvPr id="7" name="Flowchart: Process 6">
+            <a:extLst>
+              <a:ext uri="{FF2B5EF4-FFF2-40B4-BE49-F238E27FC236}">
+                <a16:creationId xmlns:a16="http://schemas.microsoft.com/office/drawing/2014/main" id="{CCDCB058-BF44-6E44-C9AA-DD2912C31919}"/>
+              </a:ext>
+            </a:extLst>
+          </p:cNvPr>
+          <p:cNvSpPr/>
+          <p:nvPr/>
+        </p:nvSpPr>
+        <p:spPr>
+          <a:xfrm>
+            <a:off x="838200" y="2970727"/>
+            <a:ext cx="1149439" cy="656822"/>
+          </a:xfrm>
+          <a:prstGeom prst="flowChartProcess">
+            <a:avLst/>
+          </a:prstGeom>
+        </p:spPr>
+        <p:style>
+          <a:lnRef idx="2">
+            <a:schemeClr val="dk1"/>
+          </a:lnRef>
+          <a:fillRef idx="1">
+            <a:schemeClr val="lt1"/>
+          </a:fillRef>
+          <a:effectRef idx="0">
+            <a:schemeClr val="dk1"/>
+          </a:effectRef>
+          <a:fontRef idx="minor">
+            <a:schemeClr val="dk1"/>
+          </a:fontRef>
+        </p:style>
+        <p:txBody>
+          <a:bodyPr rtlCol="0" anchor="ctr"/>
+          <a:lstStyle/>
+          <a:p>
+            <a:pPr algn="ctr"/>
+            <a:r>
+              <a:rPr lang="en-US" sz="1400"/>
+              <a:t>Employee</a:t>
+            </a:r>
+            <a:endParaRPr lang="en-GB" sz="1400"/>
+          </a:p>
+        </p:txBody>
+      </p:sp>
+      <p:sp>
+        <p:nvSpPr>
+          <p:cNvPr id="8" name="Oval 7">
+            <a:extLst>
+              <a:ext uri="{FF2B5EF4-FFF2-40B4-BE49-F238E27FC236}">
+                <a16:creationId xmlns:a16="http://schemas.microsoft.com/office/drawing/2014/main" id="{65667EC1-E3E3-9ABF-6014-46954BB51018}"/>
+              </a:ext>
+            </a:extLst>
+          </p:cNvPr>
+          <p:cNvSpPr/>
+          <p:nvPr/>
+        </p:nvSpPr>
+        <p:spPr>
+          <a:xfrm>
+            <a:off x="2923504" y="2695977"/>
+            <a:ext cx="1206321" cy="1206321"/>
+          </a:xfrm>
+          <a:prstGeom prst="ellipse">
+            <a:avLst/>
+          </a:prstGeom>
+        </p:spPr>
+        <p:style>
+          <a:lnRef idx="2">
+            <a:schemeClr val="dk1"/>
+          </a:lnRef>
+          <a:fillRef idx="1">
+            <a:schemeClr val="lt1"/>
+          </a:fillRef>
+          <a:effectRef idx="0">
+            <a:schemeClr val="dk1"/>
+          </a:effectRef>
+          <a:fontRef idx="minor">
+            <a:schemeClr val="dk1"/>
+          </a:fontRef>
+        </p:style>
+        <p:txBody>
+          <a:bodyPr lIns="0" tIns="0" rIns="0" bIns="0" rtlCol="0" anchor="ctr"/>
+          <a:lstStyle/>
+          <a:p>
+            <a:pPr algn="ctr"/>
+            <a:r>
+              <a:rPr lang="en-US" sz="1250"/>
+              <a:t>Web Application</a:t>
+            </a:r>
+            <a:endParaRPr lang="en-GB" sz="1250"/>
+          </a:p>
+        </p:txBody>
+      </p:sp>
+      <p:sp>
+        <p:nvSpPr>
+          <p:cNvPr id="9" name="Oval 8">
+            <a:extLst>
+              <a:ext uri="{FF2B5EF4-FFF2-40B4-BE49-F238E27FC236}">
+                <a16:creationId xmlns:a16="http://schemas.microsoft.com/office/drawing/2014/main" id="{671CA833-B3FB-54C8-9D94-B168A3DEBD51}"/>
+              </a:ext>
+            </a:extLst>
+          </p:cNvPr>
+          <p:cNvSpPr/>
+          <p:nvPr/>
+        </p:nvSpPr>
+        <p:spPr>
+          <a:xfrm>
+            <a:off x="6145369" y="1796603"/>
+            <a:ext cx="1206321" cy="1206321"/>
+          </a:xfrm>
+          <a:prstGeom prst="ellipse">
+            <a:avLst/>
+          </a:prstGeom>
+        </p:spPr>
+        <p:style>
+          <a:lnRef idx="2">
+            <a:schemeClr val="dk1"/>
+          </a:lnRef>
+          <a:fillRef idx="1">
+            <a:schemeClr val="lt1"/>
+          </a:fillRef>
+          <a:effectRef idx="0">
+            <a:schemeClr val="dk1"/>
+          </a:effectRef>
+          <a:fontRef idx="minor">
+            <a:schemeClr val="dk1"/>
+          </a:fontRef>
+        </p:style>
+        <p:txBody>
+          <a:bodyPr lIns="0" tIns="0" rIns="0" bIns="0" rtlCol="0" anchor="ctr"/>
+          <a:lstStyle/>
+          <a:p>
+            <a:pPr algn="ctr"/>
+            <a:r>
+              <a:rPr lang="en-US" sz="1400"/>
+              <a:t>Semantic Search</a:t>
+            </a:r>
+            <a:endParaRPr lang="en-GB" sz="1200"/>
+          </a:p>
+        </p:txBody>
+      </p:sp>
+      <p:cxnSp>
+        <p:nvCxnSpPr>
+          <p:cNvPr id="12" name="Straight Connector 11">
+            <a:extLst>
+              <a:ext uri="{FF2B5EF4-FFF2-40B4-BE49-F238E27FC236}">
+                <a16:creationId xmlns:a16="http://schemas.microsoft.com/office/drawing/2014/main" id="{665813A6-C11F-E746-157A-1E605BA77CD6}"/>
+              </a:ext>
+            </a:extLst>
+          </p:cNvPr>
+          <p:cNvCxnSpPr/>
+          <p:nvPr/>
+        </p:nvCxnSpPr>
+        <p:spPr>
+          <a:xfrm>
+            <a:off x="8815589" y="1959540"/>
+            <a:ext cx="1345842" cy="0"/>
+          </a:xfrm>
+          <a:prstGeom prst="line">
+            <a:avLst/>
+          </a:prstGeom>
+          <a:ln w="19050"/>
+        </p:spPr>
+        <p:style>
+          <a:lnRef idx="1">
+            <a:schemeClr val="dk1"/>
+          </a:lnRef>
+          <a:fillRef idx="0">
+            <a:schemeClr val="dk1"/>
+          </a:fillRef>
+          <a:effectRef idx="0">
+            <a:schemeClr val="dk1"/>
+          </a:effectRef>
+          <a:fontRef idx="minor">
+            <a:schemeClr val="tx1"/>
+          </a:fontRef>
+        </p:style>
+      </p:cxnSp>
+      <p:cxnSp>
+        <p:nvCxnSpPr>
+          <p:cNvPr id="13" name="Straight Connector 12">
+            <a:extLst>
+              <a:ext uri="{FF2B5EF4-FFF2-40B4-BE49-F238E27FC236}">
+                <a16:creationId xmlns:a16="http://schemas.microsoft.com/office/drawing/2014/main" id="{C1400DFD-5D69-3693-5F5C-AAA987DEC867}"/>
+              </a:ext>
+            </a:extLst>
+          </p:cNvPr>
+          <p:cNvCxnSpPr/>
+          <p:nvPr/>
+        </p:nvCxnSpPr>
+        <p:spPr>
+          <a:xfrm>
+            <a:off x="8809148" y="2670030"/>
+            <a:ext cx="1345842" cy="0"/>
+          </a:xfrm>
+          <a:prstGeom prst="line">
+            <a:avLst/>
+          </a:prstGeom>
+          <a:ln w="19050"/>
+        </p:spPr>
+        <p:style>
+          <a:lnRef idx="1">
+            <a:schemeClr val="dk1"/>
+          </a:lnRef>
+          <a:fillRef idx="0">
+            <a:schemeClr val="dk1"/>
+          </a:fillRef>
+          <a:effectRef idx="0">
+            <a:schemeClr val="dk1"/>
+          </a:effectRef>
+          <a:fontRef idx="minor">
+            <a:schemeClr val="tx1"/>
+          </a:fontRef>
+        </p:style>
+      </p:cxnSp>
+      <p:cxnSp>
+        <p:nvCxnSpPr>
+          <p:cNvPr id="15" name="Straight Arrow Connector 14">
+            <a:extLst>
+              <a:ext uri="{FF2B5EF4-FFF2-40B4-BE49-F238E27FC236}">
+                <a16:creationId xmlns:a16="http://schemas.microsoft.com/office/drawing/2014/main" id="{13223ECD-59C8-3F11-879F-745778D5527A}"/>
+              </a:ext>
+            </a:extLst>
+          </p:cNvPr>
+          <p:cNvCxnSpPr/>
+          <p:nvPr/>
+        </p:nvCxnSpPr>
+        <p:spPr>
+          <a:xfrm>
+            <a:off x="1987639" y="3146738"/>
+            <a:ext cx="935865" cy="0"/>
+          </a:xfrm>
+          <a:prstGeom prst="straightConnector1">
+            <a:avLst/>
+          </a:prstGeom>
+          <a:ln w="19050">
+            <a:tailEnd type="triangle"/>
+          </a:ln>
+        </p:spPr>
+        <p:style>
+          <a:lnRef idx="1">
+            <a:schemeClr val="dk1"/>
+          </a:lnRef>
+          <a:fillRef idx="0">
+            <a:schemeClr val="dk1"/>
+          </a:fillRef>
+          <a:effectRef idx="0">
+            <a:schemeClr val="dk1"/>
+          </a:effectRef>
+          <a:fontRef idx="minor">
+            <a:schemeClr val="tx1"/>
+          </a:fontRef>
+        </p:style>
+      </p:cxnSp>
+      <p:cxnSp>
+        <p:nvCxnSpPr>
+          <p:cNvPr id="17" name="Straight Arrow Connector 16">
+            <a:extLst>
+              <a:ext uri="{FF2B5EF4-FFF2-40B4-BE49-F238E27FC236}">
+                <a16:creationId xmlns:a16="http://schemas.microsoft.com/office/drawing/2014/main" id="{E8E33E18-13D6-E7A6-0EA1-02E319C0374D}"/>
+              </a:ext>
+            </a:extLst>
+          </p:cNvPr>
+          <p:cNvCxnSpPr>
+            <a:cxnSpLocks/>
+          </p:cNvCxnSpPr>
+          <p:nvPr/>
+        </p:nvCxnSpPr>
+        <p:spPr>
+          <a:xfrm flipV="1">
+            <a:off x="4129825" y="2253803"/>
+            <a:ext cx="2009103" cy="794197"/>
+          </a:xfrm>
+          <a:prstGeom prst="straightConnector1">
+            <a:avLst/>
+          </a:prstGeom>
+          <a:ln w="19050">
+            <a:tailEnd type="triangle"/>
+          </a:ln>
+        </p:spPr>
+        <p:style>
+          <a:lnRef idx="1">
+            <a:schemeClr val="dk1"/>
+          </a:lnRef>
+          <a:fillRef idx="0">
+            <a:schemeClr val="dk1"/>
+          </a:fillRef>
+          <a:effectRef idx="0">
+            <a:schemeClr val="dk1"/>
+          </a:effectRef>
+          <a:fontRef idx="minor">
+            <a:schemeClr val="tx1"/>
+          </a:fontRef>
+        </p:style>
+      </p:cxnSp>
+      <p:sp>
+        <p:nvSpPr>
+          <p:cNvPr id="19" name="TextBox 18">
+            <a:extLst>
+              <a:ext uri="{FF2B5EF4-FFF2-40B4-BE49-F238E27FC236}">
+                <a16:creationId xmlns:a16="http://schemas.microsoft.com/office/drawing/2014/main" id="{18D56918-E3D5-CB9E-49AF-6ADE439808A2}"/>
+              </a:ext>
+            </a:extLst>
+          </p:cNvPr>
+          <p:cNvSpPr txBox="1"/>
+          <p:nvPr/>
+        </p:nvSpPr>
+        <p:spPr>
+          <a:xfrm>
+            <a:off x="4580586" y="2338843"/>
+            <a:ext cx="669702" cy="276999"/>
+          </a:xfrm>
+          <a:prstGeom prst="rect">
+            <a:avLst/>
+          </a:prstGeom>
+          <a:noFill/>
+        </p:spPr>
+        <p:txBody>
+          <a:bodyPr wrap="square" rtlCol="0">
+            <a:spAutoFit/>
+          </a:bodyPr>
+          <a:lstStyle/>
+          <a:p>
+            <a:r>
+              <a:rPr lang="en-US" sz="1200"/>
+              <a:t>Query</a:t>
+            </a:r>
+            <a:endParaRPr lang="en-GB" sz="1200"/>
+          </a:p>
+        </p:txBody>
+      </p:sp>
+      <p:cxnSp>
+        <p:nvCxnSpPr>
+          <p:cNvPr id="21" name="Straight Arrow Connector 20">
+            <a:extLst>
+              <a:ext uri="{FF2B5EF4-FFF2-40B4-BE49-F238E27FC236}">
+                <a16:creationId xmlns:a16="http://schemas.microsoft.com/office/drawing/2014/main" id="{48EC7645-D446-3304-0E21-98950A13C762}"/>
+              </a:ext>
+            </a:extLst>
+          </p:cNvPr>
+          <p:cNvCxnSpPr>
+            <a:cxnSpLocks/>
+          </p:cNvCxnSpPr>
+          <p:nvPr/>
+        </p:nvCxnSpPr>
+        <p:spPr>
+          <a:xfrm>
+            <a:off x="4091189" y="3627549"/>
+            <a:ext cx="2041301" cy="882113"/>
+          </a:xfrm>
+          <a:prstGeom prst="straightConnector1">
+            <a:avLst/>
+          </a:prstGeom>
+          <a:ln w="12700">
+            <a:tailEnd type="triangle"/>
+          </a:ln>
+        </p:spPr>
+        <p:style>
+          <a:lnRef idx="1">
+            <a:schemeClr val="dk1"/>
+          </a:lnRef>
+          <a:fillRef idx="0">
+            <a:schemeClr val="dk1"/>
+          </a:fillRef>
+          <a:effectRef idx="0">
+            <a:schemeClr val="dk1"/>
+          </a:effectRef>
+          <a:fontRef idx="minor">
+            <a:schemeClr val="tx1"/>
+          </a:fontRef>
+        </p:style>
+      </p:cxnSp>
+      <p:cxnSp>
+        <p:nvCxnSpPr>
+          <p:cNvPr id="27" name="Straight Arrow Connector 26">
+            <a:extLst>
+              <a:ext uri="{FF2B5EF4-FFF2-40B4-BE49-F238E27FC236}">
+                <a16:creationId xmlns:a16="http://schemas.microsoft.com/office/drawing/2014/main" id="{2CEE5672-E51B-9DBC-C2FE-3E9A51A94ADC}"/>
+              </a:ext>
+            </a:extLst>
+          </p:cNvPr>
+          <p:cNvCxnSpPr>
+            <a:cxnSpLocks/>
+          </p:cNvCxnSpPr>
+          <p:nvPr/>
+        </p:nvCxnSpPr>
+        <p:spPr>
+          <a:xfrm flipH="1">
+            <a:off x="4136266" y="2564326"/>
+            <a:ext cx="1910366" cy="734811"/>
+          </a:xfrm>
+          <a:prstGeom prst="straightConnector1">
+            <a:avLst/>
+          </a:prstGeom>
+          <a:ln w="12700">
+            <a:tailEnd type="triangle"/>
+          </a:ln>
+        </p:spPr>
+        <p:style>
+          <a:lnRef idx="1">
+            <a:schemeClr val="dk1"/>
+          </a:lnRef>
+          <a:fillRef idx="0">
+            <a:schemeClr val="dk1"/>
+          </a:fillRef>
+          <a:effectRef idx="0">
+            <a:schemeClr val="dk1"/>
+          </a:effectRef>
+          <a:fontRef idx="minor">
+            <a:schemeClr val="tx1"/>
+          </a:fontRef>
+        </p:style>
+      </p:cxnSp>
+      <p:sp>
+        <p:nvSpPr>
+          <p:cNvPr id="29" name="TextBox 28">
+            <a:extLst>
+              <a:ext uri="{FF2B5EF4-FFF2-40B4-BE49-F238E27FC236}">
+                <a16:creationId xmlns:a16="http://schemas.microsoft.com/office/drawing/2014/main" id="{C94CE445-40B3-CDDA-20A2-69F4E683DA98}"/>
+              </a:ext>
+            </a:extLst>
+          </p:cNvPr>
+          <p:cNvSpPr txBox="1"/>
+          <p:nvPr/>
+        </p:nvSpPr>
+        <p:spPr>
+          <a:xfrm>
+            <a:off x="7351689" y="2465144"/>
+            <a:ext cx="1401649" cy="461665"/>
+          </a:xfrm>
+          <a:prstGeom prst="rect">
+            <a:avLst/>
+          </a:prstGeom>
+          <a:noFill/>
+        </p:spPr>
+        <p:txBody>
+          <a:bodyPr wrap="square" rtlCol="0">
+            <a:spAutoFit/>
+          </a:bodyPr>
+          <a:lstStyle/>
+          <a:p>
+            <a:r>
+              <a:rPr lang="en-US" sz="1200"/>
+              <a:t>Indexing information</a:t>
+            </a:r>
+            <a:endParaRPr lang="en-GB" sz="1200"/>
+          </a:p>
+        </p:txBody>
+      </p:sp>
+      <p:sp>
+        <p:nvSpPr>
+          <p:cNvPr id="30" name="TextBox 29">
+            <a:extLst>
+              <a:ext uri="{FF2B5EF4-FFF2-40B4-BE49-F238E27FC236}">
+                <a16:creationId xmlns:a16="http://schemas.microsoft.com/office/drawing/2014/main" id="{06E79E9F-1FD0-17E3-79E3-07D4E971C499}"/>
+              </a:ext>
+            </a:extLst>
+          </p:cNvPr>
+          <p:cNvSpPr txBox="1"/>
+          <p:nvPr/>
+        </p:nvSpPr>
+        <p:spPr>
+          <a:xfrm>
+            <a:off x="2056326" y="3450205"/>
+            <a:ext cx="896154" cy="276999"/>
+          </a:xfrm>
+          <a:prstGeom prst="rect">
+            <a:avLst/>
+          </a:prstGeom>
+          <a:noFill/>
+        </p:spPr>
+        <p:txBody>
+          <a:bodyPr wrap="square" rtlCol="0">
+            <a:spAutoFit/>
+          </a:bodyPr>
+          <a:lstStyle/>
+          <a:p>
+            <a:r>
+              <a:rPr lang="en-US" sz="1200"/>
+              <a:t>Result</a:t>
+            </a:r>
+            <a:endParaRPr lang="en-GB" sz="1200"/>
+          </a:p>
+        </p:txBody>
+      </p:sp>
+      <p:cxnSp>
+        <p:nvCxnSpPr>
+          <p:cNvPr id="32" name="Straight Arrow Connector 31">
+            <a:extLst>
+              <a:ext uri="{FF2B5EF4-FFF2-40B4-BE49-F238E27FC236}">
+                <a16:creationId xmlns:a16="http://schemas.microsoft.com/office/drawing/2014/main" id="{D45E9D7E-9F42-3DF7-6F86-EA54C7011C3B}"/>
+              </a:ext>
+            </a:extLst>
+          </p:cNvPr>
+          <p:cNvCxnSpPr>
+            <a:cxnSpLocks/>
+          </p:cNvCxnSpPr>
+          <p:nvPr/>
+        </p:nvCxnSpPr>
+        <p:spPr>
+          <a:xfrm flipH="1">
+            <a:off x="2027350" y="3408035"/>
+            <a:ext cx="827467" cy="0"/>
+          </a:xfrm>
+          <a:prstGeom prst="straightConnector1">
+            <a:avLst/>
+          </a:prstGeom>
+          <a:ln w="12700">
+            <a:tailEnd type="triangle"/>
+          </a:ln>
+        </p:spPr>
+        <p:style>
+          <a:lnRef idx="1">
+            <a:schemeClr val="dk1"/>
+          </a:lnRef>
+          <a:fillRef idx="0">
+            <a:schemeClr val="dk1"/>
+          </a:fillRef>
+          <a:effectRef idx="0">
+            <a:schemeClr val="dk1"/>
+          </a:effectRef>
+          <a:fontRef idx="minor">
+            <a:schemeClr val="tx1"/>
+          </a:fontRef>
+        </p:style>
+      </p:cxnSp>
+      <p:sp>
+        <p:nvSpPr>
+          <p:cNvPr id="34" name="TextBox 33">
+            <a:extLst>
+              <a:ext uri="{FF2B5EF4-FFF2-40B4-BE49-F238E27FC236}">
+                <a16:creationId xmlns:a16="http://schemas.microsoft.com/office/drawing/2014/main" id="{60E1477D-C5ED-C522-187C-460D04075C12}"/>
+              </a:ext>
+            </a:extLst>
+          </p:cNvPr>
+          <p:cNvSpPr txBox="1"/>
+          <p:nvPr/>
+        </p:nvSpPr>
+        <p:spPr>
+          <a:xfrm>
+            <a:off x="8809148" y="2092622"/>
+            <a:ext cx="1345842" cy="523220"/>
+          </a:xfrm>
+          <a:prstGeom prst="rect">
+            <a:avLst/>
+          </a:prstGeom>
+          <a:noFill/>
+        </p:spPr>
+        <p:txBody>
+          <a:bodyPr wrap="square" rtlCol="0">
+            <a:spAutoFit/>
+          </a:bodyPr>
+          <a:lstStyle/>
+          <a:p>
+            <a:pPr algn="ctr"/>
+            <a:r>
+              <a:rPr lang="en-US" sz="1400"/>
+              <a:t>Document Store</a:t>
+            </a:r>
+            <a:endParaRPr lang="en-GB" sz="1400"/>
+          </a:p>
+        </p:txBody>
+      </p:sp>
+      <p:sp>
+        <p:nvSpPr>
+          <p:cNvPr id="35" name="TextBox 34">
+            <a:extLst>
+              <a:ext uri="{FF2B5EF4-FFF2-40B4-BE49-F238E27FC236}">
+                <a16:creationId xmlns:a16="http://schemas.microsoft.com/office/drawing/2014/main" id="{D7F06D27-7067-4A2D-BE3E-E942A4C01A10}"/>
+              </a:ext>
+            </a:extLst>
+          </p:cNvPr>
+          <p:cNvSpPr txBox="1"/>
+          <p:nvPr/>
+        </p:nvSpPr>
+        <p:spPr>
+          <a:xfrm>
+            <a:off x="4791478" y="3517907"/>
+            <a:ext cx="1708060" cy="461665"/>
+          </a:xfrm>
+          <a:prstGeom prst="rect">
+            <a:avLst/>
+          </a:prstGeom>
+          <a:noFill/>
+        </p:spPr>
+        <p:txBody>
+          <a:bodyPr wrap="square" rtlCol="0">
+            <a:spAutoFit/>
+          </a:bodyPr>
+          <a:lstStyle/>
+          <a:p>
+            <a:r>
+              <a:rPr lang="en-US" sz="1200"/>
+              <a:t>Prompt and relevant information</a:t>
+            </a:r>
+            <a:endParaRPr lang="en-GB" sz="1200"/>
+          </a:p>
+        </p:txBody>
+      </p:sp>
+      <p:cxnSp>
+        <p:nvCxnSpPr>
+          <p:cNvPr id="37" name="Straight Arrow Connector 36">
+            <a:extLst>
+              <a:ext uri="{FF2B5EF4-FFF2-40B4-BE49-F238E27FC236}">
+                <a16:creationId xmlns:a16="http://schemas.microsoft.com/office/drawing/2014/main" id="{ED3F00A2-C72C-A5C1-9C6E-67437A603CAC}"/>
+              </a:ext>
+            </a:extLst>
+          </p:cNvPr>
+          <p:cNvCxnSpPr>
+            <a:cxnSpLocks/>
+          </p:cNvCxnSpPr>
+          <p:nvPr/>
+        </p:nvCxnSpPr>
+        <p:spPr>
+          <a:xfrm flipH="1">
+            <a:off x="7379593" y="2354232"/>
+            <a:ext cx="1206321" cy="0"/>
+          </a:xfrm>
+          <a:prstGeom prst="straightConnector1">
+            <a:avLst/>
+          </a:prstGeom>
+          <a:ln w="12700">
+            <a:tailEnd type="triangle"/>
+          </a:ln>
+        </p:spPr>
+        <p:style>
+          <a:lnRef idx="1">
+            <a:schemeClr val="dk1"/>
+          </a:lnRef>
+          <a:fillRef idx="0">
+            <a:schemeClr val="dk1"/>
+          </a:fillRef>
+          <a:effectRef idx="0">
+            <a:schemeClr val="dk1"/>
+          </a:effectRef>
+          <a:fontRef idx="minor">
+            <a:schemeClr val="tx1"/>
+          </a:fontRef>
+        </p:style>
+      </p:cxnSp>
+      <p:sp>
+        <p:nvSpPr>
+          <p:cNvPr id="42" name="TextBox 41">
+            <a:extLst>
+              <a:ext uri="{FF2B5EF4-FFF2-40B4-BE49-F238E27FC236}">
+                <a16:creationId xmlns:a16="http://schemas.microsoft.com/office/drawing/2014/main" id="{8325F363-3492-9A75-0427-793223AFC881}"/>
+              </a:ext>
+            </a:extLst>
+          </p:cNvPr>
+          <p:cNvSpPr txBox="1"/>
+          <p:nvPr/>
+        </p:nvSpPr>
+        <p:spPr>
+          <a:xfrm>
+            <a:off x="4840844" y="2952123"/>
+            <a:ext cx="1396823" cy="461665"/>
+          </a:xfrm>
+          <a:prstGeom prst="rect">
+            <a:avLst/>
+          </a:prstGeom>
+          <a:noFill/>
+        </p:spPr>
+        <p:txBody>
+          <a:bodyPr wrap="square" rtlCol="0">
+            <a:spAutoFit/>
+          </a:bodyPr>
+          <a:lstStyle/>
+          <a:p>
+            <a:r>
+              <a:rPr lang="en-US" sz="1200"/>
+              <a:t>Relevant information</a:t>
+            </a:r>
+            <a:endParaRPr lang="en-GB" sz="1200"/>
+          </a:p>
+        </p:txBody>
+      </p:sp>
+      <p:sp>
+        <p:nvSpPr>
+          <p:cNvPr id="44" name="Oval 43">
+            <a:extLst>
+              <a:ext uri="{FF2B5EF4-FFF2-40B4-BE49-F238E27FC236}">
+                <a16:creationId xmlns:a16="http://schemas.microsoft.com/office/drawing/2014/main" id="{DB9C0F42-28FA-054E-5877-4E6B340BFD71}"/>
+              </a:ext>
+            </a:extLst>
+          </p:cNvPr>
+          <p:cNvSpPr/>
+          <p:nvPr/>
+        </p:nvSpPr>
+        <p:spPr>
+          <a:xfrm>
+            <a:off x="6138928" y="4112966"/>
+            <a:ext cx="1206321" cy="1206321"/>
+          </a:xfrm>
+          <a:prstGeom prst="ellipse">
+            <a:avLst/>
+          </a:prstGeom>
+        </p:spPr>
+        <p:style>
+          <a:lnRef idx="2">
+            <a:schemeClr val="dk1"/>
+          </a:lnRef>
+          <a:fillRef idx="1">
+            <a:schemeClr val="lt1"/>
+          </a:fillRef>
+          <a:effectRef idx="0">
+            <a:schemeClr val="dk1"/>
+          </a:effectRef>
+          <a:fontRef idx="minor">
+            <a:schemeClr val="dk1"/>
+          </a:fontRef>
+        </p:style>
+        <p:txBody>
+          <a:bodyPr lIns="0" tIns="0" rIns="0" bIns="0" rtlCol="0" anchor="ctr"/>
+          <a:lstStyle/>
+          <a:p>
+            <a:pPr algn="ctr"/>
+            <a:r>
+              <a:rPr lang="en-US" sz="1400"/>
+              <a:t>LLM</a:t>
+            </a:r>
+            <a:endParaRPr lang="en-GB" sz="1200"/>
+          </a:p>
+        </p:txBody>
+      </p:sp>
+      <p:cxnSp>
+        <p:nvCxnSpPr>
+          <p:cNvPr id="48" name="Straight Arrow Connector 47">
+            <a:extLst>
+              <a:ext uri="{FF2B5EF4-FFF2-40B4-BE49-F238E27FC236}">
+                <a16:creationId xmlns:a16="http://schemas.microsoft.com/office/drawing/2014/main" id="{AA773AE7-2227-D185-B121-FB22316462D3}"/>
+              </a:ext>
+            </a:extLst>
+          </p:cNvPr>
+          <p:cNvCxnSpPr/>
+          <p:nvPr/>
+        </p:nvCxnSpPr>
+        <p:spPr>
+          <a:xfrm flipH="1" flipV="1">
+            <a:off x="4038600" y="3829318"/>
+            <a:ext cx="2008032" cy="884350"/>
+          </a:xfrm>
+          <a:prstGeom prst="straightConnector1">
+            <a:avLst/>
+          </a:prstGeom>
+          <a:ln w="12700">
+            <a:tailEnd type="triangle"/>
+          </a:ln>
+        </p:spPr>
+        <p:style>
+          <a:lnRef idx="1">
+            <a:schemeClr val="dk1"/>
+          </a:lnRef>
+          <a:fillRef idx="0">
+            <a:schemeClr val="dk1"/>
+          </a:fillRef>
+          <a:effectRef idx="0">
+            <a:schemeClr val="dk1"/>
+          </a:effectRef>
+          <a:fontRef idx="minor">
+            <a:schemeClr val="tx1"/>
+          </a:fontRef>
+        </p:style>
+      </p:cxnSp>
+      <p:sp>
+        <p:nvSpPr>
+          <p:cNvPr id="49" name="TextBox 48">
+            <a:extLst>
+              <a:ext uri="{FF2B5EF4-FFF2-40B4-BE49-F238E27FC236}">
+                <a16:creationId xmlns:a16="http://schemas.microsoft.com/office/drawing/2014/main" id="{4A298D3C-B02D-FD1D-3EAC-1F6625D98BBC}"/>
+              </a:ext>
+            </a:extLst>
+          </p:cNvPr>
+          <p:cNvSpPr txBox="1"/>
+          <p:nvPr/>
+        </p:nvSpPr>
+        <p:spPr>
+          <a:xfrm>
+            <a:off x="4424967" y="4307984"/>
+            <a:ext cx="896154" cy="461665"/>
+          </a:xfrm>
+          <a:prstGeom prst="rect">
+            <a:avLst/>
+          </a:prstGeom>
+          <a:noFill/>
+        </p:spPr>
+        <p:txBody>
+          <a:bodyPr wrap="square" rtlCol="0">
+            <a:spAutoFit/>
+          </a:bodyPr>
+          <a:lstStyle/>
+          <a:p>
+            <a:r>
+              <a:rPr lang="en-US" sz="1200"/>
+              <a:t>Response returned</a:t>
+            </a:r>
+            <a:endParaRPr lang="en-GB" sz="1200"/>
+          </a:p>
+        </p:txBody>
+      </p:sp>
+      <p:sp>
+        <p:nvSpPr>
+          <p:cNvPr id="50" name="TextBox 49">
+            <a:extLst>
+              <a:ext uri="{FF2B5EF4-FFF2-40B4-BE49-F238E27FC236}">
+                <a16:creationId xmlns:a16="http://schemas.microsoft.com/office/drawing/2014/main" id="{B3F0DE98-FEBC-D48F-7227-D91017B013C4}"/>
+              </a:ext>
+            </a:extLst>
+          </p:cNvPr>
+          <p:cNvSpPr txBox="1"/>
+          <p:nvPr/>
+        </p:nvSpPr>
+        <p:spPr>
+          <a:xfrm>
+            <a:off x="2056326" y="2753922"/>
+            <a:ext cx="896154" cy="276999"/>
+          </a:xfrm>
+          <a:prstGeom prst="rect">
+            <a:avLst/>
+          </a:prstGeom>
+          <a:noFill/>
+        </p:spPr>
+        <p:txBody>
+          <a:bodyPr wrap="square" rtlCol="0">
+            <a:spAutoFit/>
+          </a:bodyPr>
+          <a:lstStyle/>
+          <a:p>
+            <a:r>
+              <a:rPr lang="en-US" sz="1200"/>
+              <a:t>Question</a:t>
+            </a:r>
+            <a:endParaRPr lang="en-GB" sz="1200"/>
+          </a:p>
+        </p:txBody>
+      </p:sp>
+      <p:sp>
+        <p:nvSpPr>
+          <p:cNvPr id="51" name="Arc 50">
+            <a:extLst>
+              <a:ext uri="{FF2B5EF4-FFF2-40B4-BE49-F238E27FC236}">
+                <a16:creationId xmlns:a16="http://schemas.microsoft.com/office/drawing/2014/main" id="{97C04EA3-6F3F-8930-D7AB-991964786772}"/>
+              </a:ext>
+            </a:extLst>
+          </p:cNvPr>
+          <p:cNvSpPr/>
+          <p:nvPr/>
+        </p:nvSpPr>
+        <p:spPr>
+          <a:xfrm rot="1330337">
+            <a:off x="5137299" y="3711754"/>
+            <a:ext cx="712631" cy="1654122"/>
+          </a:xfrm>
+          <a:prstGeom prst="arc">
+            <a:avLst>
+              <a:gd name="adj1" fmla="val 16200000"/>
+              <a:gd name="adj2" fmla="val 5546198"/>
+            </a:avLst>
+          </a:prstGeom>
+          <a:ln w="19050">
+            <a:solidFill>
+              <a:srgbClr val="FF0000"/>
+            </a:solidFill>
+            <a:prstDash val="dash"/>
+          </a:ln>
+        </p:spPr>
+        <p:style>
+          <a:lnRef idx="1">
+            <a:schemeClr val="dk1"/>
+          </a:lnRef>
+          <a:fillRef idx="0">
+            <a:schemeClr val="dk1"/>
+          </a:fillRef>
+          <a:effectRef idx="0">
+            <a:schemeClr val="dk1"/>
+          </a:effectRef>
+          <a:fontRef idx="minor">
+            <a:schemeClr val="tx1"/>
+          </a:fontRef>
+        </p:style>
+        <p:txBody>
+          <a:bodyPr rtlCol="0" anchor="ctr"/>
+          <a:lstStyle/>
+          <a:p>
+            <a:pPr algn="ctr"/>
+            <a:endParaRPr lang="en-GB"/>
+          </a:p>
+        </p:txBody>
+      </p:sp>
+      <p:sp>
+        <p:nvSpPr>
+          <p:cNvPr id="52" name="Arc 51">
+            <a:extLst>
+              <a:ext uri="{FF2B5EF4-FFF2-40B4-BE49-F238E27FC236}">
+                <a16:creationId xmlns:a16="http://schemas.microsoft.com/office/drawing/2014/main" id="{6B649718-FA7D-5BE5-3522-7DFCFB5E1627}"/>
+              </a:ext>
+            </a:extLst>
+          </p:cNvPr>
+          <p:cNvSpPr/>
+          <p:nvPr/>
+        </p:nvSpPr>
+        <p:spPr>
+          <a:xfrm>
+            <a:off x="2049885" y="2414483"/>
+            <a:ext cx="712631" cy="1654122"/>
+          </a:xfrm>
+          <a:prstGeom prst="arc">
+            <a:avLst>
+              <a:gd name="adj1" fmla="val 16200000"/>
+              <a:gd name="adj2" fmla="val 5546198"/>
+            </a:avLst>
+          </a:prstGeom>
+          <a:ln w="19050">
+            <a:solidFill>
+              <a:srgbClr val="FF0000"/>
+            </a:solidFill>
+            <a:prstDash val="dash"/>
+          </a:ln>
+        </p:spPr>
+        <p:style>
+          <a:lnRef idx="1">
+            <a:schemeClr val="dk1"/>
+          </a:lnRef>
+          <a:fillRef idx="0">
+            <a:schemeClr val="dk1"/>
+          </a:fillRef>
+          <a:effectRef idx="0">
+            <a:schemeClr val="dk1"/>
+          </a:effectRef>
+          <a:fontRef idx="minor">
+            <a:schemeClr val="tx1"/>
+          </a:fontRef>
+        </p:style>
+        <p:txBody>
+          <a:bodyPr rtlCol="0" anchor="ctr"/>
+          <a:lstStyle/>
+          <a:p>
+            <a:pPr algn="ctr"/>
+            <a:endParaRPr lang="en-GB"/>
+          </a:p>
+        </p:txBody>
+      </p:sp>
+      <p:sp>
+        <p:nvSpPr>
+          <p:cNvPr id="53" name="Arc 52">
+            <a:extLst>
+              <a:ext uri="{FF2B5EF4-FFF2-40B4-BE49-F238E27FC236}">
+                <a16:creationId xmlns:a16="http://schemas.microsoft.com/office/drawing/2014/main" id="{F761FEF4-7855-C93F-D936-91F1679EED93}"/>
+              </a:ext>
+            </a:extLst>
+          </p:cNvPr>
+          <p:cNvSpPr/>
+          <p:nvPr/>
+        </p:nvSpPr>
+        <p:spPr>
+          <a:xfrm>
+            <a:off x="7695125" y="1572702"/>
+            <a:ext cx="712631" cy="1654122"/>
+          </a:xfrm>
+          <a:prstGeom prst="arc">
+            <a:avLst>
+              <a:gd name="adj1" fmla="val 16200000"/>
+              <a:gd name="adj2" fmla="val 5546198"/>
+            </a:avLst>
+          </a:prstGeom>
+          <a:ln w="19050">
+            <a:solidFill>
+              <a:srgbClr val="FF0000"/>
+            </a:solidFill>
+            <a:prstDash val="dash"/>
+          </a:ln>
+        </p:spPr>
+        <p:style>
+          <a:lnRef idx="1">
+            <a:schemeClr val="dk1"/>
+          </a:lnRef>
+          <a:fillRef idx="0">
+            <a:schemeClr val="dk1"/>
+          </a:fillRef>
+          <a:effectRef idx="0">
+            <a:schemeClr val="dk1"/>
+          </a:effectRef>
+          <a:fontRef idx="minor">
+            <a:schemeClr val="tx1"/>
+          </a:fontRef>
+        </p:style>
+        <p:txBody>
+          <a:bodyPr rtlCol="0" anchor="ctr"/>
+          <a:lstStyle/>
+          <a:p>
+            <a:pPr algn="ctr"/>
+            <a:endParaRPr lang="en-GB"/>
+          </a:p>
+        </p:txBody>
+      </p:sp>
+      <p:sp>
+        <p:nvSpPr>
+          <p:cNvPr id="54" name="TextBox 53">
+            <a:extLst>
+              <a:ext uri="{FF2B5EF4-FFF2-40B4-BE49-F238E27FC236}">
+                <a16:creationId xmlns:a16="http://schemas.microsoft.com/office/drawing/2014/main" id="{4310468B-B4F9-347C-0A3E-9871FE28BEFD}"/>
+              </a:ext>
+            </a:extLst>
+          </p:cNvPr>
+          <p:cNvSpPr txBox="1"/>
+          <p:nvPr/>
+        </p:nvSpPr>
+        <p:spPr>
+          <a:xfrm>
+            <a:off x="547352" y="5796205"/>
+            <a:ext cx="9405871" cy="307777"/>
+          </a:xfrm>
+          <a:prstGeom prst="rect">
+            <a:avLst/>
+          </a:prstGeom>
+          <a:noFill/>
+          <a:ln>
+            <a:noFill/>
+          </a:ln>
+        </p:spPr>
+        <p:txBody>
+          <a:bodyPr wrap="square" rtlCol="0">
+            <a:spAutoFit/>
+          </a:bodyPr>
+          <a:lstStyle/>
+          <a:p>
+            <a:r>
+              <a:rPr lang="en-US" sz="1400"/>
+              <a:t>For more information see https://owasp.org/www-community/Threat_Modeling_Process#data-flow-diagrams</a:t>
+            </a:r>
+            <a:endParaRPr lang="en-GB" sz="1400"/>
+          </a:p>
+        </p:txBody>
+      </p:sp>
+    </p:spTree>
+    <p:extLst>
+      <p:ext uri="{BB962C8B-B14F-4D97-AF65-F5344CB8AC3E}">
+        <p14:creationId xmlns:p14="http://schemas.microsoft.com/office/powerpoint/2010/main" val="791617626"/>
+      </p:ext>
+    </p:extLst>
+  </p:cSld>
+  <p:clrMapOvr>
+    <a:masterClrMapping/>
+  </p:clrMapOvr>
+</p:sld>
+</file>
+
+<file path=ppt/slides/slide11.xml><?xml version="1.0" encoding="utf-8"?>
+<p:sld xmlns:a="http://schemas.openxmlformats.org/drawingml/2006/main" xmlns:r="http://schemas.openxmlformats.org/officeDocument/2006/relationships" xmlns:p="http://schemas.openxmlformats.org/presentationml/2006/main">
+  <p:cSld>
     <p:bg>
       <p:bgPr>
         <a:solidFill>
@@ -37414,7 +38596,7 @@
                   <a:spcPts val="600"/>
                 </a:spcAft>
               </a:pPr>
-              <a:t>10</a:t>
+              <a:t>11</a:t>
             </a:fld>
             <a:endParaRPr lang="en-US">
               <a:solidFill>
@@ -37468,7 +38650,7 @@
 </p:sld>
 </file>
 
-<file path=ppt/slides/slide11.xml><?xml version="1.0" encoding="utf-8"?>
+<file path=ppt/slides/slide12.xml><?xml version="1.0" encoding="utf-8"?>
 <p:sld xmlns:a="http://schemas.openxmlformats.org/drawingml/2006/main" xmlns:r="http://schemas.openxmlformats.org/officeDocument/2006/relationships" xmlns:p="http://schemas.openxmlformats.org/presentationml/2006/main">
   <p:cSld>
     <p:spTree>
@@ -37619,7 +38801,7 @@
           <a:p>
             <a:fld id="{A65A5C87-DF58-40C8-B092-1DE63DB4547E}" type="slidenum">
               <a:rPr lang="en-US" smtClean="0"/>
-              <a:t>11</a:t>
+              <a:t>12</a:t>
             </a:fld>
             <a:endParaRPr lang="en-US"/>
           </a:p>
@@ -37638,7 +38820,7 @@
 </p:sld>
 </file>
 
-<file path=ppt/slides/slide12.xml><?xml version="1.0" encoding="utf-8"?>
+<file path=ppt/slides/slide13.xml><?xml version="1.0" encoding="utf-8"?>
 <p:sld xmlns:a="http://schemas.openxmlformats.org/drawingml/2006/main" xmlns:r="http://schemas.openxmlformats.org/officeDocument/2006/relationships" xmlns:p="http://schemas.openxmlformats.org/presentationml/2006/main">
   <p:cSld>
     <p:spTree>
@@ -37800,7 +38982,7 @@
           <a:p>
             <a:fld id="{A65A5C87-DF58-40C8-B092-1DE63DB4547E}" type="slidenum">
               <a:rPr lang="en-US" smtClean="0"/>
-              <a:t>12</a:t>
+              <a:t>13</a:t>
             </a:fld>
             <a:endParaRPr lang="en-US"/>
           </a:p>
@@ -37819,7 +39001,1460 @@
 </p:sld>
 </file>
 
-<file path=ppt/slides/slide13.xml><?xml version="1.0" encoding="utf-8"?>
+<file path=ppt/slides/slide14.xml><?xml version="1.0" encoding="utf-8"?>
+<p:sld xmlns:a="http://schemas.openxmlformats.org/drawingml/2006/main" xmlns:r="http://schemas.openxmlformats.org/officeDocument/2006/relationships" xmlns:p="http://schemas.openxmlformats.org/presentationml/2006/main">
+  <p:cSld>
+    <p:bg>
+      <p:bgPr>
+        <a:solidFill>
+          <a:schemeClr val="bg1"/>
+        </a:solidFill>
+        <a:effectLst/>
+      </p:bgPr>
+    </p:bg>
+    <p:spTree>
+      <p:nvGrpSpPr>
+        <p:cNvPr id="1" name=""/>
+        <p:cNvGrpSpPr/>
+        <p:nvPr/>
+      </p:nvGrpSpPr>
+      <p:grpSpPr>
+        <a:xfrm>
+          <a:off x="0" y="0"/>
+          <a:ext cx="0" cy="0"/>
+          <a:chOff x="0" y="0"/>
+          <a:chExt cx="0" cy="0"/>
+        </a:xfrm>
+      </p:grpSpPr>
+      <p:sp>
+        <p:nvSpPr>
+          <p:cNvPr id="12" name="Rectangle 11">
+            <a:extLst>
+              <a:ext uri="{FF2B5EF4-FFF2-40B4-BE49-F238E27FC236}">
+                <a16:creationId xmlns:a16="http://schemas.microsoft.com/office/drawing/2014/main" id="{3F89FC01-D0CF-4899-A184-1F007036308A}"/>
+              </a:ext>
+              <a:ext uri="{C183D7F6-B498-43B3-948B-1728B52AA6E4}">
+                <adec:decorative xmlns:adec="http://schemas.microsoft.com/office/drawing/2017/decorative" val="1"/>
+              </a:ext>
+            </a:extLst>
+          </p:cNvPr>
+          <p:cNvSpPr>
+            <a:spLocks noGrp="1" noRot="1" noChangeAspect="1" noMove="1" noResize="1" noEditPoints="1" noAdjustHandles="1" noChangeArrowheads="1" noChangeShapeType="1" noTextEdit="1"/>
+          </p:cNvSpPr>
+          <p:nvPr>
+            <p:extLst>
+              <p:ext uri="{386F3935-93C4-4BCD-93E2-E3B085C9AB24}">
+                <p16:designElem xmlns:p16="http://schemas.microsoft.com/office/powerpoint/2015/main" val="1"/>
+              </p:ext>
+            </p:extLst>
+          </p:nvPr>
+        </p:nvSpPr>
+        <p:spPr>
+          <a:xfrm>
+            <a:off x="1" y="6400800"/>
+            <a:ext cx="12192000" cy="457200"/>
+          </a:xfrm>
+          <a:prstGeom prst="rect">
+            <a:avLst/>
+          </a:prstGeom>
+          <a:solidFill>
+            <a:schemeClr val="accent2"/>
+          </a:solidFill>
+          <a:ln>
+            <a:noFill/>
+          </a:ln>
+        </p:spPr>
+        <p:style>
+          <a:lnRef idx="2">
+            <a:schemeClr val="accent1">
+              <a:shade val="50000"/>
+            </a:schemeClr>
+          </a:lnRef>
+          <a:fillRef idx="1">
+            <a:schemeClr val="accent1"/>
+          </a:fillRef>
+          <a:effectRef idx="0">
+            <a:schemeClr val="accent1"/>
+          </a:effectRef>
+          <a:fontRef idx="minor">
+            <a:schemeClr val="lt1"/>
+          </a:fontRef>
+        </p:style>
+        <p:txBody>
+          <a:bodyPr/>
+          <a:lstStyle/>
+          <a:p>
+            <a:endParaRPr lang="en-GB"/>
+          </a:p>
+        </p:txBody>
+      </p:sp>
+      <p:sp>
+        <p:nvSpPr>
+          <p:cNvPr id="14" name="Rectangle 13">
+            <a:extLst>
+              <a:ext uri="{FF2B5EF4-FFF2-40B4-BE49-F238E27FC236}">
+                <a16:creationId xmlns:a16="http://schemas.microsoft.com/office/drawing/2014/main" id="{F4E5A9FF-C93F-4A6D-ABDE-2533C3017B89}"/>
+              </a:ext>
+              <a:ext uri="{C183D7F6-B498-43B3-948B-1728B52AA6E4}">
+                <adec:decorative xmlns:adec="http://schemas.microsoft.com/office/drawing/2017/decorative" val="1"/>
+              </a:ext>
+            </a:extLst>
+          </p:cNvPr>
+          <p:cNvSpPr>
+            <a:spLocks noGrp="1" noRot="1" noChangeAspect="1" noMove="1" noResize="1" noEditPoints="1" noAdjustHandles="1" noChangeArrowheads="1" noChangeShapeType="1" noTextEdit="1"/>
+          </p:cNvSpPr>
+          <p:nvPr>
+            <p:extLst>
+              <p:ext uri="{386F3935-93C4-4BCD-93E2-E3B085C9AB24}">
+                <p16:designElem xmlns:p16="http://schemas.microsoft.com/office/powerpoint/2015/main" val="1"/>
+              </p:ext>
+            </p:extLst>
+          </p:nvPr>
+        </p:nvSpPr>
+        <p:spPr>
+          <a:xfrm>
+            <a:off x="15" y="6334316"/>
+            <a:ext cx="12191985" cy="66484"/>
+          </a:xfrm>
+          <a:prstGeom prst="rect">
+            <a:avLst/>
+          </a:prstGeom>
+          <a:solidFill>
+            <a:schemeClr val="accent1"/>
+          </a:solidFill>
+          <a:ln>
+            <a:noFill/>
+          </a:ln>
+        </p:spPr>
+        <p:style>
+          <a:lnRef idx="2">
+            <a:schemeClr val="accent1">
+              <a:shade val="50000"/>
+            </a:schemeClr>
+          </a:lnRef>
+          <a:fillRef idx="1">
+            <a:schemeClr val="accent1"/>
+          </a:fillRef>
+          <a:effectRef idx="0">
+            <a:schemeClr val="accent1"/>
+          </a:effectRef>
+          <a:fontRef idx="minor">
+            <a:schemeClr val="lt1"/>
+          </a:fontRef>
+        </p:style>
+        <p:txBody>
+          <a:bodyPr/>
+          <a:lstStyle/>
+          <a:p>
+            <a:endParaRPr lang="en-GB"/>
+          </a:p>
+        </p:txBody>
+      </p:sp>
+      <p:cxnSp>
+        <p:nvCxnSpPr>
+          <p:cNvPr id="16" name="Straight Connector 15">
+            <a:extLst>
+              <a:ext uri="{FF2B5EF4-FFF2-40B4-BE49-F238E27FC236}">
+                <a16:creationId xmlns:a16="http://schemas.microsoft.com/office/drawing/2014/main" id="{890A4124-979D-4376-AA58-6501D58B67BD}"/>
+              </a:ext>
+              <a:ext uri="{C183D7F6-B498-43B3-948B-1728B52AA6E4}">
+                <adec:decorative xmlns:adec="http://schemas.microsoft.com/office/drawing/2017/decorative" val="1"/>
+              </a:ext>
+            </a:extLst>
+          </p:cNvPr>
+          <p:cNvCxnSpPr>
+            <a:cxnSpLocks noGrp="1" noRot="1" noChangeAspect="1" noMove="1" noResize="1" noEditPoints="1" noAdjustHandles="1" noChangeArrowheads="1" noChangeShapeType="1"/>
+          </p:cNvCxnSpPr>
+          <p:nvPr>
+            <p:extLst>
+              <p:ext uri="{386F3935-93C4-4BCD-93E2-E3B085C9AB24}">
+                <p16:designElem xmlns:p16="http://schemas.microsoft.com/office/powerpoint/2015/main" val="1"/>
+              </p:ext>
+            </p:extLst>
+          </p:nvPr>
+        </p:nvCxnSpPr>
+        <p:spPr>
+          <a:xfrm>
+            <a:off x="1193532" y="1737845"/>
+            <a:ext cx="9966960" cy="0"/>
+          </a:xfrm>
+          <a:prstGeom prst="line">
+            <a:avLst/>
+          </a:prstGeom>
+          <a:ln w="6350">
+            <a:solidFill>
+              <a:schemeClr val="tx1">
+                <a:lumMod val="50000"/>
+                <a:lumOff val="50000"/>
+              </a:schemeClr>
+            </a:solidFill>
+          </a:ln>
+        </p:spPr>
+        <p:style>
+          <a:lnRef idx="1">
+            <a:schemeClr val="accent1"/>
+          </a:lnRef>
+          <a:fillRef idx="0">
+            <a:schemeClr val="accent1"/>
+          </a:fillRef>
+          <a:effectRef idx="0">
+            <a:schemeClr val="accent1"/>
+          </a:effectRef>
+          <a:fontRef idx="minor">
+            <a:schemeClr val="tx1"/>
+          </a:fontRef>
+        </p:style>
+      </p:cxnSp>
+      <p:sp useBgFill="1">
+        <p:nvSpPr>
+          <p:cNvPr id="18" name="Rectangle 17">
+            <a:extLst>
+              <a:ext uri="{FF2B5EF4-FFF2-40B4-BE49-F238E27FC236}">
+                <a16:creationId xmlns:a16="http://schemas.microsoft.com/office/drawing/2014/main" id="{35A52B12-0826-4A26-ABA2-386F7211134E}"/>
+              </a:ext>
+              <a:ext uri="{C183D7F6-B498-43B3-948B-1728B52AA6E4}">
+                <adec:decorative xmlns:adec="http://schemas.microsoft.com/office/drawing/2017/decorative" val="1"/>
+              </a:ext>
+            </a:extLst>
+          </p:cNvPr>
+          <p:cNvSpPr>
+            <a:spLocks noGrp="1" noRot="1" noChangeAspect="1" noMove="1" noResize="1" noEditPoints="1" noAdjustHandles="1" noChangeArrowheads="1" noChangeShapeType="1" noTextEdit="1"/>
+          </p:cNvSpPr>
+          <p:nvPr>
+            <p:extLst>
+              <p:ext uri="{386F3935-93C4-4BCD-93E2-E3B085C9AB24}">
+                <p16:designElem xmlns:p16="http://schemas.microsoft.com/office/powerpoint/2015/main" val="1"/>
+              </p:ext>
+            </p:extLst>
+          </p:nvPr>
+        </p:nvSpPr>
+        <p:spPr>
+          <a:xfrm>
+            <a:off x="0" y="0"/>
+            <a:ext cx="12186315" cy="6858000"/>
+          </a:xfrm>
+          <a:prstGeom prst="rect">
+            <a:avLst/>
+          </a:prstGeom>
+          <a:ln>
+            <a:noFill/>
+          </a:ln>
+        </p:spPr>
+        <p:style>
+          <a:lnRef idx="2">
+            <a:schemeClr val="accent6">
+              <a:shade val="50000"/>
+            </a:schemeClr>
+          </a:lnRef>
+          <a:fillRef idx="1001">
+            <a:schemeClr val="lt1"/>
+          </a:fillRef>
+          <a:effectRef idx="0">
+            <a:schemeClr val="accent6"/>
+          </a:effectRef>
+          <a:fontRef idx="minor">
+            <a:schemeClr val="lt1"/>
+          </a:fontRef>
+        </p:style>
+        <p:txBody>
+          <a:bodyPr rtlCol="0" anchor="ctr"/>
+          <a:lstStyle/>
+          <a:p>
+            <a:pPr algn="ctr"/>
+            <a:endParaRPr lang="en-US"/>
+          </a:p>
+        </p:txBody>
+      </p:sp>
+      <p:sp>
+        <p:nvSpPr>
+          <p:cNvPr id="20" name="Rectangle 19">
+            <a:extLst>
+              <a:ext uri="{FF2B5EF4-FFF2-40B4-BE49-F238E27FC236}">
+                <a16:creationId xmlns:a16="http://schemas.microsoft.com/office/drawing/2014/main" id="{3DD0DA68-F652-496F-B8B5-9A66255CA0CA}"/>
+              </a:ext>
+              <a:ext uri="{C183D7F6-B498-43B3-948B-1728B52AA6E4}">
+                <adec:decorative xmlns:adec="http://schemas.microsoft.com/office/drawing/2017/decorative" val="1"/>
+              </a:ext>
+            </a:extLst>
+          </p:cNvPr>
+          <p:cNvSpPr>
+            <a:spLocks noGrp="1" noRot="1" noChangeAspect="1" noMove="1" noResize="1" noEditPoints="1" noAdjustHandles="1" noChangeArrowheads="1" noChangeShapeType="1" noTextEdit="1"/>
+          </p:cNvSpPr>
+          <p:nvPr>
+            <p:extLst>
+              <p:ext uri="{386F3935-93C4-4BCD-93E2-E3B085C9AB24}">
+                <p16:designElem xmlns:p16="http://schemas.microsoft.com/office/powerpoint/2015/main" val="1"/>
+              </p:ext>
+            </p:extLst>
+          </p:nvPr>
+        </p:nvSpPr>
+        <p:spPr>
+          <a:xfrm>
+            <a:off x="16" y="0"/>
+            <a:ext cx="4050791" cy="6858000"/>
+          </a:xfrm>
+          <a:prstGeom prst="rect">
+            <a:avLst/>
+          </a:prstGeom>
+          <a:solidFill>
+            <a:schemeClr val="accent2"/>
+          </a:solidFill>
+          <a:ln>
+            <a:noFill/>
+          </a:ln>
+        </p:spPr>
+        <p:style>
+          <a:lnRef idx="2">
+            <a:schemeClr val="accent1">
+              <a:shade val="50000"/>
+            </a:schemeClr>
+          </a:lnRef>
+          <a:fillRef idx="1">
+            <a:schemeClr val="accent1"/>
+          </a:fillRef>
+          <a:effectRef idx="0">
+            <a:schemeClr val="accent1"/>
+          </a:effectRef>
+          <a:fontRef idx="minor">
+            <a:schemeClr val="lt1"/>
+          </a:fontRef>
+        </p:style>
+        <p:txBody>
+          <a:bodyPr/>
+          <a:lstStyle/>
+          <a:p>
+            <a:endParaRPr lang="en-GB"/>
+          </a:p>
+        </p:txBody>
+      </p:sp>
+      <p:sp>
+        <p:nvSpPr>
+          <p:cNvPr id="2" name="Title 1">
+            <a:extLst>
+              <a:ext uri="{FF2B5EF4-FFF2-40B4-BE49-F238E27FC236}">
+                <a16:creationId xmlns:a16="http://schemas.microsoft.com/office/drawing/2014/main" id="{47636F3A-A829-6A09-CA26-3552D5FF716C}"/>
+              </a:ext>
+            </a:extLst>
+          </p:cNvPr>
+          <p:cNvSpPr>
+            <a:spLocks noGrp="1"/>
+          </p:cNvSpPr>
+          <p:nvPr>
+            <p:ph type="title"/>
+          </p:nvPr>
+        </p:nvSpPr>
+        <p:spPr>
+          <a:xfrm>
+            <a:off x="492370" y="516835"/>
+            <a:ext cx="3084844" cy="2103875"/>
+          </a:xfrm>
+        </p:spPr>
+        <p:txBody>
+          <a:bodyPr vert="horz" lIns="91440" tIns="45720" rIns="91440" bIns="45720" rtlCol="0" anchor="b">
+            <a:normAutofit/>
+          </a:bodyPr>
+          <a:lstStyle/>
+          <a:p>
+            <a:r>
+              <a:rPr lang="en-US" sz="3600">
+                <a:solidFill>
+                  <a:srgbClr val="FFFFFF"/>
+                </a:solidFill>
+              </a:rPr>
+              <a:t>Application of STRIDE to Trust Boundaries</a:t>
+            </a:r>
+          </a:p>
+        </p:txBody>
+      </p:sp>
+      <p:sp>
+        <p:nvSpPr>
+          <p:cNvPr id="22" name="Rectangle 21">
+            <a:extLst>
+              <a:ext uri="{FF2B5EF4-FFF2-40B4-BE49-F238E27FC236}">
+                <a16:creationId xmlns:a16="http://schemas.microsoft.com/office/drawing/2014/main" id="{DDF50AF6-4E23-4BD9-92C7-45A3E16E4120}"/>
+              </a:ext>
+              <a:ext uri="{C183D7F6-B498-43B3-948B-1728B52AA6E4}">
+                <adec:decorative xmlns:adec="http://schemas.microsoft.com/office/drawing/2017/decorative" val="1"/>
+              </a:ext>
+            </a:extLst>
+          </p:cNvPr>
+          <p:cNvSpPr>
+            <a:spLocks noGrp="1" noRot="1" noChangeAspect="1" noMove="1" noResize="1" noEditPoints="1" noAdjustHandles="1" noChangeArrowheads="1" noChangeShapeType="1" noTextEdit="1"/>
+          </p:cNvSpPr>
+          <p:nvPr>
+            <p:extLst>
+              <p:ext uri="{386F3935-93C4-4BCD-93E2-E3B085C9AB24}">
+                <p16:designElem xmlns:p16="http://schemas.microsoft.com/office/powerpoint/2015/main" val="1"/>
+              </p:ext>
+            </p:extLst>
+          </p:nvPr>
+        </p:nvSpPr>
+        <p:spPr>
+          <a:xfrm>
+            <a:off x="4040071" y="0"/>
+            <a:ext cx="64008" cy="6858000"/>
+          </a:xfrm>
+          <a:prstGeom prst="rect">
+            <a:avLst/>
+          </a:prstGeom>
+          <a:solidFill>
+            <a:schemeClr val="accent1"/>
+          </a:solidFill>
+          <a:ln>
+            <a:noFill/>
+          </a:ln>
+        </p:spPr>
+        <p:style>
+          <a:lnRef idx="2">
+            <a:schemeClr val="accent1">
+              <a:shade val="50000"/>
+            </a:schemeClr>
+          </a:lnRef>
+          <a:fillRef idx="1">
+            <a:schemeClr val="accent1"/>
+          </a:fillRef>
+          <a:effectRef idx="0">
+            <a:schemeClr val="accent1"/>
+          </a:effectRef>
+          <a:fontRef idx="minor">
+            <a:schemeClr val="lt1"/>
+          </a:fontRef>
+        </p:style>
+        <p:txBody>
+          <a:bodyPr/>
+          <a:lstStyle/>
+          <a:p>
+            <a:endParaRPr lang="en-GB"/>
+          </a:p>
+        </p:txBody>
+      </p:sp>
+      <p:sp>
+        <p:nvSpPr>
+          <p:cNvPr id="5" name="Footer Placeholder 4">
+            <a:extLst>
+              <a:ext uri="{FF2B5EF4-FFF2-40B4-BE49-F238E27FC236}">
+                <a16:creationId xmlns:a16="http://schemas.microsoft.com/office/drawing/2014/main" id="{2F852576-735C-6557-19F7-067DCAAAE4C3}"/>
+              </a:ext>
+            </a:extLst>
+          </p:cNvPr>
+          <p:cNvSpPr>
+            <a:spLocks noGrp="1"/>
+          </p:cNvSpPr>
+          <p:nvPr>
+            <p:ph type="ftr" sz="quarter" idx="11"/>
+          </p:nvPr>
+        </p:nvSpPr>
+        <p:spPr>
+          <a:xfrm>
+            <a:off x="1089175" y="6459785"/>
+            <a:ext cx="3757243" cy="365125"/>
+          </a:xfrm>
+        </p:spPr>
+        <p:txBody>
+          <a:bodyPr vert="horz" lIns="91440" tIns="45720" rIns="91440" bIns="45720" rtlCol="0" anchor="ctr">
+            <a:normAutofit/>
+          </a:bodyPr>
+          <a:lstStyle/>
+          <a:p>
+            <a:pPr algn="l" defTabSz="914400">
+              <a:spcAft>
+                <a:spcPts val="600"/>
+              </a:spcAft>
+            </a:pPr>
+            <a:r>
+              <a:rPr lang="en-US" kern="1200" cap="all" baseline="0">
+                <a:solidFill>
+                  <a:srgbClr val="FFFFFF"/>
+                </a:solidFill>
+                <a:latin typeface="+mn-lt"/>
+                <a:ea typeface="+mn-ea"/>
+                <a:cs typeface="+mn-cs"/>
+              </a:rPr>
+              <a:t>SteelCon 2025</a:t>
+            </a:r>
+          </a:p>
+        </p:txBody>
+      </p:sp>
+      <p:sp>
+        <p:nvSpPr>
+          <p:cNvPr id="4" name="Date Placeholder 3">
+            <a:extLst>
+              <a:ext uri="{FF2B5EF4-FFF2-40B4-BE49-F238E27FC236}">
+                <a16:creationId xmlns:a16="http://schemas.microsoft.com/office/drawing/2014/main" id="{EC8493A6-382F-F34C-96FD-844D7DFE8D20}"/>
+              </a:ext>
+            </a:extLst>
+          </p:cNvPr>
+          <p:cNvSpPr>
+            <a:spLocks noGrp="1"/>
+          </p:cNvSpPr>
+          <p:nvPr>
+            <p:ph type="dt" sz="half" idx="10"/>
+          </p:nvPr>
+        </p:nvSpPr>
+        <p:spPr>
+          <a:xfrm>
+            <a:off x="5364202" y="6459785"/>
+            <a:ext cx="1735371" cy="365125"/>
+          </a:xfrm>
+        </p:spPr>
+        <p:txBody>
+          <a:bodyPr vert="horz" lIns="91440" tIns="45720" rIns="91440" bIns="45720" rtlCol="0" anchor="ctr">
+            <a:normAutofit/>
+          </a:bodyPr>
+          <a:lstStyle/>
+          <a:p>
+            <a:pPr algn="r" defTabSz="914400">
+              <a:spcAft>
+                <a:spcPts val="600"/>
+              </a:spcAft>
+            </a:pPr>
+            <a:r>
+              <a:rPr lang="en-US"/>
+              <a:t>11/07/2025</a:t>
+            </a:r>
+          </a:p>
+        </p:txBody>
+      </p:sp>
+      <p:sp>
+        <p:nvSpPr>
+          <p:cNvPr id="6" name="Slide Number Placeholder 5">
+            <a:extLst>
+              <a:ext uri="{FF2B5EF4-FFF2-40B4-BE49-F238E27FC236}">
+                <a16:creationId xmlns:a16="http://schemas.microsoft.com/office/drawing/2014/main" id="{4E3C1923-2995-D176-27ED-162EA2522FD7}"/>
+              </a:ext>
+            </a:extLst>
+          </p:cNvPr>
+          <p:cNvSpPr>
+            <a:spLocks noGrp="1"/>
+          </p:cNvSpPr>
+          <p:nvPr>
+            <p:ph type="sldNum" sz="quarter" idx="12"/>
+          </p:nvPr>
+        </p:nvSpPr>
+        <p:spPr>
+          <a:xfrm>
+            <a:off x="9900458" y="6459785"/>
+            <a:ext cx="1312025" cy="365125"/>
+          </a:xfrm>
+        </p:spPr>
+        <p:txBody>
+          <a:bodyPr vert="horz" lIns="91440" tIns="45720" rIns="91440" bIns="45720" rtlCol="0" anchor="ctr">
+            <a:normAutofit/>
+          </a:bodyPr>
+          <a:lstStyle/>
+          <a:p>
+            <a:pPr defTabSz="914400">
+              <a:spcAft>
+                <a:spcPts val="600"/>
+              </a:spcAft>
+            </a:pPr>
+            <a:fld id="{A65A5C87-DF58-40C8-B092-1DE63DB4547E}" type="slidenum">
+              <a:rPr lang="en-US">
+                <a:solidFill>
+                  <a:schemeClr val="tx2"/>
+                </a:solidFill>
+              </a:rPr>
+              <a:pPr defTabSz="914400">
+                <a:spcAft>
+                  <a:spcPts val="600"/>
+                </a:spcAft>
+              </a:pPr>
+              <a:t>14</a:t>
+            </a:fld>
+            <a:endParaRPr lang="en-US">
+              <a:solidFill>
+                <a:schemeClr val="tx2"/>
+              </a:solidFill>
+            </a:endParaRPr>
+          </a:p>
+        </p:txBody>
+      </p:sp>
+      <p:graphicFrame>
+        <p:nvGraphicFramePr>
+          <p:cNvPr id="7" name="Content Placeholder 6">
+            <a:extLst>
+              <a:ext uri="{FF2B5EF4-FFF2-40B4-BE49-F238E27FC236}">
+                <a16:creationId xmlns:a16="http://schemas.microsoft.com/office/drawing/2014/main" id="{1AFF2DEA-72F2-F6F1-BE37-805331FA1F67}"/>
+              </a:ext>
+            </a:extLst>
+          </p:cNvPr>
+          <p:cNvGraphicFramePr>
+            <a:graphicFrameLocks noGrp="1"/>
+          </p:cNvGraphicFramePr>
+          <p:nvPr>
+            <p:ph idx="4294967295"/>
+            <p:extLst>
+              <p:ext uri="{D42A27DB-BD31-4B8C-83A1-F6EECF244321}">
+                <p14:modId xmlns:p14="http://schemas.microsoft.com/office/powerpoint/2010/main" val="3365086368"/>
+              </p:ext>
+            </p:extLst>
+          </p:nvPr>
+        </p:nvGraphicFramePr>
+        <p:xfrm>
+          <a:off x="5445430" y="2004060"/>
+          <a:ext cx="5391258" cy="2849880"/>
+        </p:xfrm>
+        <a:graphic>
+          <a:graphicData uri="http://schemas.openxmlformats.org/drawingml/2006/table">
+            <a:tbl>
+              <a:tblPr firstRow="1" bandRow="1">
+                <a:tableStyleId>{5C22544A-7EE6-4342-B048-85BDC9FD1C3A}</a:tableStyleId>
+              </a:tblPr>
+              <a:tblGrid>
+                <a:gridCol w="1336464">
+                  <a:extLst>
+                    <a:ext uri="{9D8B030D-6E8A-4147-A177-3AD203B41FA5}">
+                      <a16:colId xmlns:a16="http://schemas.microsoft.com/office/drawing/2014/main" val="2719123764"/>
+                    </a:ext>
+                  </a:extLst>
+                </a:gridCol>
+                <a:gridCol w="675799">
+                  <a:extLst>
+                    <a:ext uri="{9D8B030D-6E8A-4147-A177-3AD203B41FA5}">
+                      <a16:colId xmlns:a16="http://schemas.microsoft.com/office/drawing/2014/main" val="782899012"/>
+                    </a:ext>
+                  </a:extLst>
+                </a:gridCol>
+                <a:gridCol w="675799">
+                  <a:extLst>
+                    <a:ext uri="{9D8B030D-6E8A-4147-A177-3AD203B41FA5}">
+                      <a16:colId xmlns:a16="http://schemas.microsoft.com/office/drawing/2014/main" val="3529928310"/>
+                    </a:ext>
+                  </a:extLst>
+                </a:gridCol>
+                <a:gridCol w="675799">
+                  <a:extLst>
+                    <a:ext uri="{9D8B030D-6E8A-4147-A177-3AD203B41FA5}">
+                      <a16:colId xmlns:a16="http://schemas.microsoft.com/office/drawing/2014/main" val="2412389861"/>
+                    </a:ext>
+                  </a:extLst>
+                </a:gridCol>
+                <a:gridCol w="675799">
+                  <a:extLst>
+                    <a:ext uri="{9D8B030D-6E8A-4147-A177-3AD203B41FA5}">
+                      <a16:colId xmlns:a16="http://schemas.microsoft.com/office/drawing/2014/main" val="2431084439"/>
+                    </a:ext>
+                  </a:extLst>
+                </a:gridCol>
+                <a:gridCol w="675799">
+                  <a:extLst>
+                    <a:ext uri="{9D8B030D-6E8A-4147-A177-3AD203B41FA5}">
+                      <a16:colId xmlns:a16="http://schemas.microsoft.com/office/drawing/2014/main" val="2746443737"/>
+                    </a:ext>
+                  </a:extLst>
+                </a:gridCol>
+                <a:gridCol w="675799">
+                  <a:extLst>
+                    <a:ext uri="{9D8B030D-6E8A-4147-A177-3AD203B41FA5}">
+                      <a16:colId xmlns:a16="http://schemas.microsoft.com/office/drawing/2014/main" val="503934096"/>
+                    </a:ext>
+                  </a:extLst>
+                </a:gridCol>
+              </a:tblGrid>
+              <a:tr h="368808">
+                <a:tc>
+                  <a:txBody>
+                    <a:bodyPr/>
+                    <a:lstStyle/>
+                    <a:p>
+                      <a:endParaRPr lang="en-US" sz="1700"/>
+                    </a:p>
+                  </a:txBody>
+                  <a:tcPr marL="83820" marR="83820" marT="41910" marB="41910"/>
+                </a:tc>
+                <a:tc>
+                  <a:txBody>
+                    <a:bodyPr/>
+                    <a:lstStyle/>
+                    <a:p>
+                      <a:pPr algn="ctr"/>
+                      <a:r>
+                        <a:rPr lang="en-GB" sz="1700"/>
+                        <a:t>S</a:t>
+                      </a:r>
+                    </a:p>
+                  </a:txBody>
+                  <a:tcPr marL="83820" marR="83820" marT="41910" marB="41910"/>
+                </a:tc>
+                <a:tc>
+                  <a:txBody>
+                    <a:bodyPr/>
+                    <a:lstStyle/>
+                    <a:p>
+                      <a:pPr algn="ctr"/>
+                      <a:r>
+                        <a:rPr lang="en-GB" sz="1700"/>
+                        <a:t>T</a:t>
+                      </a:r>
+                    </a:p>
+                  </a:txBody>
+                  <a:tcPr marL="83820" marR="83820" marT="41910" marB="41910"/>
+                </a:tc>
+                <a:tc>
+                  <a:txBody>
+                    <a:bodyPr/>
+                    <a:lstStyle/>
+                    <a:p>
+                      <a:pPr algn="ctr"/>
+                      <a:r>
+                        <a:rPr lang="en-GB" sz="1700"/>
+                        <a:t>R</a:t>
+                      </a:r>
+                    </a:p>
+                  </a:txBody>
+                  <a:tcPr marL="83820" marR="83820" marT="41910" marB="41910"/>
+                </a:tc>
+                <a:tc>
+                  <a:txBody>
+                    <a:bodyPr/>
+                    <a:lstStyle/>
+                    <a:p>
+                      <a:pPr algn="ctr"/>
+                      <a:r>
+                        <a:rPr lang="en-GB" sz="1700"/>
+                        <a:t>I</a:t>
+                      </a:r>
+                    </a:p>
+                  </a:txBody>
+                  <a:tcPr marL="83820" marR="83820" marT="41910" marB="41910"/>
+                </a:tc>
+                <a:tc>
+                  <a:txBody>
+                    <a:bodyPr/>
+                    <a:lstStyle/>
+                    <a:p>
+                      <a:pPr algn="ctr"/>
+                      <a:r>
+                        <a:rPr lang="en-GB" sz="1700"/>
+                        <a:t>D</a:t>
+                      </a:r>
+                    </a:p>
+                  </a:txBody>
+                  <a:tcPr marL="83820" marR="83820" marT="41910" marB="41910"/>
+                </a:tc>
+                <a:tc>
+                  <a:txBody>
+                    <a:bodyPr/>
+                    <a:lstStyle/>
+                    <a:p>
+                      <a:pPr algn="ctr"/>
+                      <a:r>
+                        <a:rPr lang="en-GB" sz="1700"/>
+                        <a:t>E</a:t>
+                      </a:r>
+                    </a:p>
+                  </a:txBody>
+                  <a:tcPr marL="83820" marR="83820" marT="41910" marB="41910"/>
+                </a:tc>
+                <a:extLst>
+                  <a:ext uri="{0D108BD9-81ED-4DB2-BD59-A6C34878D82A}">
+                    <a16:rowId xmlns:a16="http://schemas.microsoft.com/office/drawing/2014/main" val="2639620749"/>
+                  </a:ext>
+                </a:extLst>
+              </a:tr>
+              <a:tr h="620268">
+                <a:tc>
+                  <a:txBody>
+                    <a:bodyPr/>
+                    <a:lstStyle/>
+                    <a:p>
+                      <a:r>
+                        <a:rPr lang="en-GB" sz="1700" b="1"/>
+                        <a:t>External Entity</a:t>
+                      </a:r>
+                    </a:p>
+                  </a:txBody>
+                  <a:tcPr marL="83820" marR="83820" marT="41910" marB="41910"/>
+                </a:tc>
+                <a:tc>
+                  <a:txBody>
+                    <a:bodyPr/>
+                    <a:lstStyle/>
+                    <a:p>
+                      <a:pPr algn="ctr"/>
+                      <a:r>
+                        <a:rPr lang="en-GB" sz="3300" b="1">
+                          <a:sym typeface="Wingdings" panose="05000000000000000000" pitchFamily="2" charset="2"/>
+                        </a:rPr>
+                        <a:t></a:t>
+                      </a:r>
+                      <a:endParaRPr lang="en-GB" sz="1700" b="1"/>
+                    </a:p>
+                  </a:txBody>
+                  <a:tcPr marL="83820" marR="83820" marT="41910" marB="41910"/>
+                </a:tc>
+                <a:tc>
+                  <a:txBody>
+                    <a:bodyPr/>
+                    <a:lstStyle/>
+                    <a:p>
+                      <a:pPr algn="ctr"/>
+                      <a:endParaRPr lang="en-GB" sz="1700"/>
+                    </a:p>
+                  </a:txBody>
+                  <a:tcPr marL="83820" marR="83820" marT="41910" marB="41910"/>
+                </a:tc>
+                <a:tc>
+                  <a:txBody>
+                    <a:bodyPr/>
+                    <a:lstStyle/>
+                    <a:p>
+                      <a:pPr algn="ctr"/>
+                      <a:r>
+                        <a:rPr lang="en-GB" sz="3300" b="1" kern="1200">
+                          <a:solidFill>
+                            <a:schemeClr val="dk1"/>
+                          </a:solidFill>
+                          <a:latin typeface="+mn-lt"/>
+                          <a:ea typeface="+mn-ea"/>
+                          <a:cs typeface="+mn-cs"/>
+                          <a:sym typeface="Wingdings" panose="05000000000000000000" pitchFamily="2" charset="2"/>
+                        </a:rPr>
+                        <a:t></a:t>
+                      </a:r>
+                      <a:endParaRPr lang="en-GB" sz="3300" b="1" kern="1200">
+                        <a:solidFill>
+                          <a:schemeClr val="dk1"/>
+                        </a:solidFill>
+                        <a:latin typeface="+mn-lt"/>
+                        <a:ea typeface="+mn-ea"/>
+                        <a:cs typeface="+mn-cs"/>
+                      </a:endParaRPr>
+                    </a:p>
+                  </a:txBody>
+                  <a:tcPr marL="83820" marR="83820" marT="41910" marB="41910"/>
+                </a:tc>
+                <a:tc>
+                  <a:txBody>
+                    <a:bodyPr/>
+                    <a:lstStyle/>
+                    <a:p>
+                      <a:pPr algn="ctr"/>
+                      <a:endParaRPr lang="en-GB" sz="1700"/>
+                    </a:p>
+                  </a:txBody>
+                  <a:tcPr marL="83820" marR="83820" marT="41910" marB="41910"/>
+                </a:tc>
+                <a:tc>
+                  <a:txBody>
+                    <a:bodyPr/>
+                    <a:lstStyle/>
+                    <a:p>
+                      <a:pPr algn="ctr"/>
+                      <a:endParaRPr lang="en-GB" sz="1700"/>
+                    </a:p>
+                  </a:txBody>
+                  <a:tcPr marL="83820" marR="83820" marT="41910" marB="41910"/>
+                </a:tc>
+                <a:tc>
+                  <a:txBody>
+                    <a:bodyPr/>
+                    <a:lstStyle/>
+                    <a:p>
+                      <a:pPr algn="ctr"/>
+                      <a:endParaRPr lang="en-GB" sz="1700"/>
+                    </a:p>
+                  </a:txBody>
+                  <a:tcPr marL="83820" marR="83820" marT="41910" marB="41910"/>
+                </a:tc>
+                <a:extLst>
+                  <a:ext uri="{0D108BD9-81ED-4DB2-BD59-A6C34878D82A}">
+                    <a16:rowId xmlns:a16="http://schemas.microsoft.com/office/drawing/2014/main" val="788614424"/>
+                  </a:ext>
+                </a:extLst>
+              </a:tr>
+              <a:tr h="620268">
+                <a:tc>
+                  <a:txBody>
+                    <a:bodyPr/>
+                    <a:lstStyle/>
+                    <a:p>
+                      <a:r>
+                        <a:rPr lang="en-US" sz="1700" b="1"/>
+                        <a:t>Process</a:t>
+                      </a:r>
+                      <a:endParaRPr lang="en-GB" sz="1700" b="1"/>
+                    </a:p>
+                  </a:txBody>
+                  <a:tcPr marL="83820" marR="83820" marT="41910" marB="41910"/>
+                </a:tc>
+                <a:tc>
+                  <a:txBody>
+                    <a:bodyPr/>
+                    <a:lstStyle/>
+                    <a:p>
+                      <a:pPr marL="0" marR="0" lvl="0" indent="0" algn="ctr" defTabSz="914400" rtl="0" eaLnBrk="1" fontAlgn="auto" latinLnBrk="0" hangingPunct="1">
+                        <a:lnSpc>
+                          <a:spcPct val="100000"/>
+                        </a:lnSpc>
+                        <a:spcBef>
+                          <a:spcPts val="0"/>
+                        </a:spcBef>
+                        <a:spcAft>
+                          <a:spcPts val="0"/>
+                        </a:spcAft>
+                        <a:buClrTx/>
+                        <a:buSzTx/>
+                        <a:buFontTx/>
+                        <a:buNone/>
+                        <a:tabLst/>
+                        <a:defRPr/>
+                      </a:pPr>
+                      <a:r>
+                        <a:rPr lang="en-GB" sz="3300" b="1" kern="1200">
+                          <a:solidFill>
+                            <a:schemeClr val="dk1"/>
+                          </a:solidFill>
+                          <a:latin typeface="+mn-lt"/>
+                          <a:ea typeface="+mn-ea"/>
+                          <a:cs typeface="+mn-cs"/>
+                          <a:sym typeface="Wingdings" panose="05000000000000000000" pitchFamily="2" charset="2"/>
+                        </a:rPr>
+                        <a:t></a:t>
+                      </a:r>
+                      <a:endParaRPr lang="en-GB" sz="3300" b="1" kern="1200">
+                        <a:solidFill>
+                          <a:schemeClr val="dk1"/>
+                        </a:solidFill>
+                        <a:latin typeface="+mn-lt"/>
+                        <a:ea typeface="+mn-ea"/>
+                        <a:cs typeface="+mn-cs"/>
+                      </a:endParaRPr>
+                    </a:p>
+                  </a:txBody>
+                  <a:tcPr marL="83820" marR="83820" marT="41910" marB="41910"/>
+                </a:tc>
+                <a:tc>
+                  <a:txBody>
+                    <a:bodyPr/>
+                    <a:lstStyle/>
+                    <a:p>
+                      <a:pPr marL="0" marR="0" lvl="0" indent="0" algn="ctr" defTabSz="914400" rtl="0" eaLnBrk="1" fontAlgn="auto" latinLnBrk="0" hangingPunct="1">
+                        <a:lnSpc>
+                          <a:spcPct val="100000"/>
+                        </a:lnSpc>
+                        <a:spcBef>
+                          <a:spcPts val="0"/>
+                        </a:spcBef>
+                        <a:spcAft>
+                          <a:spcPts val="0"/>
+                        </a:spcAft>
+                        <a:buClrTx/>
+                        <a:buSzTx/>
+                        <a:buFontTx/>
+                        <a:buNone/>
+                        <a:tabLst/>
+                        <a:defRPr/>
+                      </a:pPr>
+                      <a:r>
+                        <a:rPr lang="en-GB" sz="3300" b="1" kern="1200">
+                          <a:solidFill>
+                            <a:schemeClr val="dk1"/>
+                          </a:solidFill>
+                          <a:latin typeface="+mn-lt"/>
+                          <a:ea typeface="+mn-ea"/>
+                          <a:cs typeface="+mn-cs"/>
+                          <a:sym typeface="Wingdings" panose="05000000000000000000" pitchFamily="2" charset="2"/>
+                        </a:rPr>
+                        <a:t></a:t>
+                      </a:r>
+                      <a:endParaRPr lang="en-GB" sz="3300" b="1" kern="1200">
+                        <a:solidFill>
+                          <a:schemeClr val="dk1"/>
+                        </a:solidFill>
+                        <a:latin typeface="+mn-lt"/>
+                        <a:ea typeface="+mn-ea"/>
+                        <a:cs typeface="+mn-cs"/>
+                      </a:endParaRPr>
+                    </a:p>
+                  </a:txBody>
+                  <a:tcPr marL="83820" marR="83820" marT="41910" marB="41910"/>
+                </a:tc>
+                <a:tc>
+                  <a:txBody>
+                    <a:bodyPr/>
+                    <a:lstStyle/>
+                    <a:p>
+                      <a:pPr algn="ctr"/>
+                      <a:r>
+                        <a:rPr lang="en-GB" sz="3300" b="1" kern="1200">
+                          <a:solidFill>
+                            <a:schemeClr val="dk1"/>
+                          </a:solidFill>
+                          <a:latin typeface="+mn-lt"/>
+                          <a:ea typeface="+mn-ea"/>
+                          <a:cs typeface="+mn-cs"/>
+                          <a:sym typeface="Wingdings" panose="05000000000000000000" pitchFamily="2" charset="2"/>
+                        </a:rPr>
+                        <a:t></a:t>
+                      </a:r>
+                      <a:endParaRPr lang="en-GB" sz="3300" b="1" kern="1200">
+                        <a:solidFill>
+                          <a:schemeClr val="dk1"/>
+                        </a:solidFill>
+                        <a:latin typeface="+mn-lt"/>
+                        <a:ea typeface="+mn-ea"/>
+                        <a:cs typeface="+mn-cs"/>
+                      </a:endParaRPr>
+                    </a:p>
+                  </a:txBody>
+                  <a:tcPr marL="83820" marR="83820" marT="41910" marB="41910"/>
+                </a:tc>
+                <a:tc>
+                  <a:txBody>
+                    <a:bodyPr/>
+                    <a:lstStyle/>
+                    <a:p>
+                      <a:pPr algn="ctr"/>
+                      <a:r>
+                        <a:rPr lang="en-GB" sz="3300" b="1" kern="1200">
+                          <a:solidFill>
+                            <a:schemeClr val="dk1"/>
+                          </a:solidFill>
+                          <a:latin typeface="+mn-lt"/>
+                          <a:ea typeface="+mn-ea"/>
+                          <a:cs typeface="+mn-cs"/>
+                          <a:sym typeface="Wingdings" panose="05000000000000000000" pitchFamily="2" charset="2"/>
+                        </a:rPr>
+                        <a:t></a:t>
+                      </a:r>
+                      <a:endParaRPr lang="en-GB" sz="3300" b="1" kern="1200">
+                        <a:solidFill>
+                          <a:schemeClr val="dk1"/>
+                        </a:solidFill>
+                        <a:latin typeface="+mn-lt"/>
+                        <a:ea typeface="+mn-ea"/>
+                        <a:cs typeface="+mn-cs"/>
+                      </a:endParaRPr>
+                    </a:p>
+                  </a:txBody>
+                  <a:tcPr marL="83820" marR="83820" marT="41910" marB="41910"/>
+                </a:tc>
+                <a:tc>
+                  <a:txBody>
+                    <a:bodyPr/>
+                    <a:lstStyle/>
+                    <a:p>
+                      <a:pPr algn="ctr"/>
+                      <a:r>
+                        <a:rPr lang="en-GB" sz="3300" b="1" kern="1200">
+                          <a:solidFill>
+                            <a:schemeClr val="dk1"/>
+                          </a:solidFill>
+                          <a:latin typeface="+mn-lt"/>
+                          <a:ea typeface="+mn-ea"/>
+                          <a:cs typeface="+mn-cs"/>
+                          <a:sym typeface="Wingdings" panose="05000000000000000000" pitchFamily="2" charset="2"/>
+                        </a:rPr>
+                        <a:t></a:t>
+                      </a:r>
+                      <a:endParaRPr lang="en-GB" sz="3300" b="1" kern="1200">
+                        <a:solidFill>
+                          <a:schemeClr val="dk1"/>
+                        </a:solidFill>
+                        <a:latin typeface="+mn-lt"/>
+                        <a:ea typeface="+mn-ea"/>
+                        <a:cs typeface="+mn-cs"/>
+                      </a:endParaRPr>
+                    </a:p>
+                  </a:txBody>
+                  <a:tcPr marL="83820" marR="83820" marT="41910" marB="41910"/>
+                </a:tc>
+                <a:tc>
+                  <a:txBody>
+                    <a:bodyPr/>
+                    <a:lstStyle/>
+                    <a:p>
+                      <a:pPr algn="ctr"/>
+                      <a:r>
+                        <a:rPr lang="en-GB" sz="3300" b="1" kern="1200">
+                          <a:solidFill>
+                            <a:schemeClr val="dk1"/>
+                          </a:solidFill>
+                          <a:latin typeface="+mn-lt"/>
+                          <a:ea typeface="+mn-ea"/>
+                          <a:cs typeface="+mn-cs"/>
+                          <a:sym typeface="Wingdings" panose="05000000000000000000" pitchFamily="2" charset="2"/>
+                        </a:rPr>
+                        <a:t></a:t>
+                      </a:r>
+                      <a:endParaRPr lang="en-GB" sz="3300" b="1" kern="1200">
+                        <a:solidFill>
+                          <a:schemeClr val="dk1"/>
+                        </a:solidFill>
+                        <a:latin typeface="+mn-lt"/>
+                        <a:ea typeface="+mn-ea"/>
+                        <a:cs typeface="+mn-cs"/>
+                      </a:endParaRPr>
+                    </a:p>
+                  </a:txBody>
+                  <a:tcPr marL="83820" marR="83820" marT="41910" marB="41910"/>
+                </a:tc>
+                <a:extLst>
+                  <a:ext uri="{0D108BD9-81ED-4DB2-BD59-A6C34878D82A}">
+                    <a16:rowId xmlns:a16="http://schemas.microsoft.com/office/drawing/2014/main" val="3168012413"/>
+                  </a:ext>
+                </a:extLst>
+              </a:tr>
+              <a:tr h="620268">
+                <a:tc>
+                  <a:txBody>
+                    <a:bodyPr/>
+                    <a:lstStyle/>
+                    <a:p>
+                      <a:r>
+                        <a:rPr lang="en-US" sz="1700" b="1"/>
+                        <a:t>Data Store</a:t>
+                      </a:r>
+                      <a:endParaRPr lang="en-GB" sz="1700" b="1"/>
+                    </a:p>
+                  </a:txBody>
+                  <a:tcPr marL="83820" marR="83820" marT="41910" marB="41910"/>
+                </a:tc>
+                <a:tc>
+                  <a:txBody>
+                    <a:bodyPr/>
+                    <a:lstStyle/>
+                    <a:p>
+                      <a:pPr algn="ctr"/>
+                      <a:endParaRPr lang="en-GB" sz="3300" b="1" kern="1200">
+                        <a:solidFill>
+                          <a:schemeClr val="dk1"/>
+                        </a:solidFill>
+                        <a:latin typeface="+mn-lt"/>
+                        <a:ea typeface="+mn-ea"/>
+                        <a:cs typeface="+mn-cs"/>
+                      </a:endParaRPr>
+                    </a:p>
+                  </a:txBody>
+                  <a:tcPr marL="83820" marR="83820" marT="41910" marB="41910"/>
+                </a:tc>
+                <a:tc>
+                  <a:txBody>
+                    <a:bodyPr/>
+                    <a:lstStyle/>
+                    <a:p>
+                      <a:pPr algn="ctr"/>
+                      <a:r>
+                        <a:rPr lang="en-GB" sz="3300" b="1" kern="1200">
+                          <a:solidFill>
+                            <a:schemeClr val="dk1"/>
+                          </a:solidFill>
+                          <a:latin typeface="+mn-lt"/>
+                          <a:ea typeface="+mn-ea"/>
+                          <a:cs typeface="+mn-cs"/>
+                          <a:sym typeface="Wingdings" panose="05000000000000000000" pitchFamily="2" charset="2"/>
+                        </a:rPr>
+                        <a:t></a:t>
+                      </a:r>
+                      <a:endParaRPr lang="en-GB" sz="3300" b="1" kern="1200">
+                        <a:solidFill>
+                          <a:schemeClr val="dk1"/>
+                        </a:solidFill>
+                        <a:latin typeface="+mn-lt"/>
+                        <a:ea typeface="+mn-ea"/>
+                        <a:cs typeface="+mn-cs"/>
+                      </a:endParaRPr>
+                    </a:p>
+                  </a:txBody>
+                  <a:tcPr marL="83820" marR="83820" marT="41910" marB="41910"/>
+                </a:tc>
+                <a:tc>
+                  <a:txBody>
+                    <a:bodyPr/>
+                    <a:lstStyle/>
+                    <a:p>
+                      <a:pPr algn="ctr"/>
+                      <a:r>
+                        <a:rPr lang="en-US" sz="3300" b="1" kern="1200">
+                          <a:solidFill>
+                            <a:schemeClr val="dk1"/>
+                          </a:solidFill>
+                          <a:latin typeface="+mn-lt"/>
+                          <a:ea typeface="+mn-ea"/>
+                          <a:cs typeface="+mn-cs"/>
+                        </a:rPr>
+                        <a:t>?</a:t>
+                      </a:r>
+                      <a:endParaRPr lang="en-GB" sz="3300" b="1" kern="1200">
+                        <a:solidFill>
+                          <a:schemeClr val="dk1"/>
+                        </a:solidFill>
+                        <a:latin typeface="+mn-lt"/>
+                        <a:ea typeface="+mn-ea"/>
+                        <a:cs typeface="+mn-cs"/>
+                      </a:endParaRPr>
+                    </a:p>
+                  </a:txBody>
+                  <a:tcPr marL="83820" marR="83820" marT="41910" marB="41910"/>
+                </a:tc>
+                <a:tc>
+                  <a:txBody>
+                    <a:bodyPr/>
+                    <a:lstStyle/>
+                    <a:p>
+                      <a:pPr algn="ctr"/>
+                      <a:r>
+                        <a:rPr lang="en-GB" sz="3300" b="1" kern="1200">
+                          <a:solidFill>
+                            <a:schemeClr val="dk1"/>
+                          </a:solidFill>
+                          <a:latin typeface="+mn-lt"/>
+                          <a:ea typeface="+mn-ea"/>
+                          <a:cs typeface="+mn-cs"/>
+                          <a:sym typeface="Wingdings" panose="05000000000000000000" pitchFamily="2" charset="2"/>
+                        </a:rPr>
+                        <a:t></a:t>
+                      </a:r>
+                      <a:endParaRPr lang="en-GB" sz="3300" b="1" kern="1200">
+                        <a:solidFill>
+                          <a:schemeClr val="dk1"/>
+                        </a:solidFill>
+                        <a:latin typeface="+mn-lt"/>
+                        <a:ea typeface="+mn-ea"/>
+                        <a:cs typeface="+mn-cs"/>
+                      </a:endParaRPr>
+                    </a:p>
+                  </a:txBody>
+                  <a:tcPr marL="83820" marR="83820" marT="41910" marB="41910"/>
+                </a:tc>
+                <a:tc>
+                  <a:txBody>
+                    <a:bodyPr/>
+                    <a:lstStyle/>
+                    <a:p>
+                      <a:pPr algn="ctr"/>
+                      <a:r>
+                        <a:rPr lang="en-GB" sz="3300" b="1" kern="1200">
+                          <a:solidFill>
+                            <a:schemeClr val="dk1"/>
+                          </a:solidFill>
+                          <a:latin typeface="+mn-lt"/>
+                          <a:ea typeface="+mn-ea"/>
+                          <a:cs typeface="+mn-cs"/>
+                          <a:sym typeface="Wingdings" panose="05000000000000000000" pitchFamily="2" charset="2"/>
+                        </a:rPr>
+                        <a:t></a:t>
+                      </a:r>
+                      <a:endParaRPr lang="en-GB" sz="3300" b="1" kern="1200">
+                        <a:solidFill>
+                          <a:schemeClr val="dk1"/>
+                        </a:solidFill>
+                        <a:latin typeface="+mn-lt"/>
+                        <a:ea typeface="+mn-ea"/>
+                        <a:cs typeface="+mn-cs"/>
+                      </a:endParaRPr>
+                    </a:p>
+                  </a:txBody>
+                  <a:tcPr marL="83820" marR="83820" marT="41910" marB="41910"/>
+                </a:tc>
+                <a:tc>
+                  <a:txBody>
+                    <a:bodyPr/>
+                    <a:lstStyle/>
+                    <a:p>
+                      <a:pPr algn="ctr"/>
+                      <a:endParaRPr lang="en-GB" sz="3300" b="1" kern="1200">
+                        <a:solidFill>
+                          <a:schemeClr val="dk1"/>
+                        </a:solidFill>
+                        <a:latin typeface="+mn-lt"/>
+                        <a:ea typeface="+mn-ea"/>
+                        <a:cs typeface="+mn-cs"/>
+                      </a:endParaRPr>
+                    </a:p>
+                  </a:txBody>
+                  <a:tcPr marL="83820" marR="83820" marT="41910" marB="41910"/>
+                </a:tc>
+                <a:extLst>
+                  <a:ext uri="{0D108BD9-81ED-4DB2-BD59-A6C34878D82A}">
+                    <a16:rowId xmlns:a16="http://schemas.microsoft.com/office/drawing/2014/main" val="1887920600"/>
+                  </a:ext>
+                </a:extLst>
+              </a:tr>
+              <a:tr h="620268">
+                <a:tc>
+                  <a:txBody>
+                    <a:bodyPr/>
+                    <a:lstStyle/>
+                    <a:p>
+                      <a:r>
+                        <a:rPr lang="en-US" sz="1700" b="1"/>
+                        <a:t>Data Flow</a:t>
+                      </a:r>
+                      <a:endParaRPr lang="en-GB" sz="1700" b="1"/>
+                    </a:p>
+                  </a:txBody>
+                  <a:tcPr marL="83820" marR="83820" marT="41910" marB="41910"/>
+                </a:tc>
+                <a:tc>
+                  <a:txBody>
+                    <a:bodyPr/>
+                    <a:lstStyle/>
+                    <a:p>
+                      <a:pPr algn="ctr"/>
+                      <a:endParaRPr lang="en-GB" sz="3300" b="1" kern="1200">
+                        <a:solidFill>
+                          <a:schemeClr val="dk1"/>
+                        </a:solidFill>
+                        <a:latin typeface="+mn-lt"/>
+                        <a:ea typeface="+mn-ea"/>
+                        <a:cs typeface="+mn-cs"/>
+                      </a:endParaRPr>
+                    </a:p>
+                  </a:txBody>
+                  <a:tcPr marL="83820" marR="83820" marT="41910" marB="41910"/>
+                </a:tc>
+                <a:tc>
+                  <a:txBody>
+                    <a:bodyPr/>
+                    <a:lstStyle/>
+                    <a:p>
+                      <a:pPr algn="ctr"/>
+                      <a:r>
+                        <a:rPr lang="en-GB" sz="3300" b="1" kern="1200">
+                          <a:solidFill>
+                            <a:schemeClr val="dk1"/>
+                          </a:solidFill>
+                          <a:latin typeface="+mn-lt"/>
+                          <a:ea typeface="+mn-ea"/>
+                          <a:cs typeface="+mn-cs"/>
+                          <a:sym typeface="Wingdings" panose="05000000000000000000" pitchFamily="2" charset="2"/>
+                        </a:rPr>
+                        <a:t></a:t>
+                      </a:r>
+                      <a:endParaRPr lang="en-GB" sz="3300" b="1" kern="1200">
+                        <a:solidFill>
+                          <a:schemeClr val="dk1"/>
+                        </a:solidFill>
+                        <a:latin typeface="+mn-lt"/>
+                        <a:ea typeface="+mn-ea"/>
+                        <a:cs typeface="+mn-cs"/>
+                      </a:endParaRPr>
+                    </a:p>
+                  </a:txBody>
+                  <a:tcPr marL="83820" marR="83820" marT="41910" marB="41910"/>
+                </a:tc>
+                <a:tc>
+                  <a:txBody>
+                    <a:bodyPr/>
+                    <a:lstStyle/>
+                    <a:p>
+                      <a:pPr algn="ctr"/>
+                      <a:endParaRPr lang="en-GB" sz="3300" b="1" kern="1200">
+                        <a:solidFill>
+                          <a:schemeClr val="dk1"/>
+                        </a:solidFill>
+                        <a:latin typeface="+mn-lt"/>
+                        <a:ea typeface="+mn-ea"/>
+                        <a:cs typeface="+mn-cs"/>
+                      </a:endParaRPr>
+                    </a:p>
+                  </a:txBody>
+                  <a:tcPr marL="83820" marR="83820" marT="41910" marB="41910"/>
+                </a:tc>
+                <a:tc>
+                  <a:txBody>
+                    <a:bodyPr/>
+                    <a:lstStyle/>
+                    <a:p>
+                      <a:pPr algn="ctr"/>
+                      <a:r>
+                        <a:rPr lang="en-GB" sz="3300" b="1" kern="1200">
+                          <a:solidFill>
+                            <a:schemeClr val="dk1"/>
+                          </a:solidFill>
+                          <a:latin typeface="+mn-lt"/>
+                          <a:ea typeface="+mn-ea"/>
+                          <a:cs typeface="+mn-cs"/>
+                          <a:sym typeface="Wingdings" panose="05000000000000000000" pitchFamily="2" charset="2"/>
+                        </a:rPr>
+                        <a:t></a:t>
+                      </a:r>
+                      <a:endParaRPr lang="en-GB" sz="3300" b="1" kern="1200">
+                        <a:solidFill>
+                          <a:schemeClr val="dk1"/>
+                        </a:solidFill>
+                        <a:latin typeface="+mn-lt"/>
+                        <a:ea typeface="+mn-ea"/>
+                        <a:cs typeface="+mn-cs"/>
+                      </a:endParaRPr>
+                    </a:p>
+                  </a:txBody>
+                  <a:tcPr marL="83820" marR="83820" marT="41910" marB="41910"/>
+                </a:tc>
+                <a:tc>
+                  <a:txBody>
+                    <a:bodyPr/>
+                    <a:lstStyle/>
+                    <a:p>
+                      <a:pPr algn="ctr"/>
+                      <a:r>
+                        <a:rPr lang="en-GB" sz="3300" b="1" kern="1200">
+                          <a:solidFill>
+                            <a:schemeClr val="dk1"/>
+                          </a:solidFill>
+                          <a:latin typeface="+mn-lt"/>
+                          <a:ea typeface="+mn-ea"/>
+                          <a:cs typeface="+mn-cs"/>
+                          <a:sym typeface="Wingdings" panose="05000000000000000000" pitchFamily="2" charset="2"/>
+                        </a:rPr>
+                        <a:t></a:t>
+                      </a:r>
+                      <a:endParaRPr lang="en-GB" sz="3300" b="1" kern="1200">
+                        <a:solidFill>
+                          <a:schemeClr val="dk1"/>
+                        </a:solidFill>
+                        <a:latin typeface="+mn-lt"/>
+                        <a:ea typeface="+mn-ea"/>
+                        <a:cs typeface="+mn-cs"/>
+                      </a:endParaRPr>
+                    </a:p>
+                  </a:txBody>
+                  <a:tcPr marL="83820" marR="83820" marT="41910" marB="41910"/>
+                </a:tc>
+                <a:tc>
+                  <a:txBody>
+                    <a:bodyPr/>
+                    <a:lstStyle/>
+                    <a:p>
+                      <a:pPr algn="ctr"/>
+                      <a:endParaRPr lang="en-GB" sz="3300" b="1" kern="1200" dirty="0">
+                        <a:solidFill>
+                          <a:schemeClr val="dk1"/>
+                        </a:solidFill>
+                        <a:latin typeface="+mn-lt"/>
+                        <a:ea typeface="+mn-ea"/>
+                        <a:cs typeface="+mn-cs"/>
+                      </a:endParaRPr>
+                    </a:p>
+                  </a:txBody>
+                  <a:tcPr marL="83820" marR="83820" marT="41910" marB="41910"/>
+                </a:tc>
+                <a:extLst>
+                  <a:ext uri="{0D108BD9-81ED-4DB2-BD59-A6C34878D82A}">
+                    <a16:rowId xmlns:a16="http://schemas.microsoft.com/office/drawing/2014/main" val="2089553883"/>
+                  </a:ext>
+                </a:extLst>
+              </a:tr>
+            </a:tbl>
+          </a:graphicData>
+        </a:graphic>
+      </p:graphicFrame>
+    </p:spTree>
+    <p:extLst>
+      <p:ext uri="{BB962C8B-B14F-4D97-AF65-F5344CB8AC3E}">
+        <p14:creationId xmlns:p14="http://schemas.microsoft.com/office/powerpoint/2010/main" val="959476923"/>
+      </p:ext>
+    </p:extLst>
+  </p:cSld>
+  <p:clrMapOvr>
+    <a:masterClrMapping/>
+  </p:clrMapOvr>
+</p:sld>
+</file>
+
+<file path=ppt/slides/slide15.xml><?xml version="1.0" encoding="utf-8"?>
 <p:sld xmlns:a="http://schemas.openxmlformats.org/drawingml/2006/main" xmlns:r="http://schemas.openxmlformats.org/officeDocument/2006/relationships" xmlns:p="http://schemas.openxmlformats.org/presentationml/2006/main">
   <p:cSld>
     <p:spTree>
@@ -37981,7 +40616,7 @@
           <a:p>
             <a:fld id="{A65A5C87-DF58-40C8-B092-1DE63DB4547E}" type="slidenum">
               <a:rPr lang="en-US" smtClean="0"/>
-              <a:t>13</a:t>
+              <a:t>15</a:t>
             </a:fld>
             <a:endParaRPr lang="en-US"/>
           </a:p>
@@ -38000,7 +40635,7 @@
 </p:sld>
 </file>
 
-<file path=ppt/slides/slide14.xml><?xml version="1.0" encoding="utf-8"?>
+<file path=ppt/slides/slide16.xml><?xml version="1.0" encoding="utf-8"?>
 <p:sld xmlns:a="http://schemas.openxmlformats.org/drawingml/2006/main" xmlns:r="http://schemas.openxmlformats.org/officeDocument/2006/relationships" xmlns:p="http://schemas.openxmlformats.org/presentationml/2006/main">
   <p:cSld>
     <p:spTree>
@@ -38096,7 +40731,7 @@
           <a:p>
             <a:fld id="{A65A5C87-DF58-40C8-B092-1DE63DB4547E}" type="slidenum">
               <a:rPr lang="en-US" smtClean="0"/>
-              <a:t>14</a:t>
+              <a:t>16</a:t>
             </a:fld>
             <a:endParaRPr lang="en-US"/>
           </a:p>
@@ -38145,7 +40780,7 @@
 </p:sld>
 </file>
 
-<file path=ppt/slides/slide15.xml><?xml version="1.0" encoding="utf-8"?>
+<file path=ppt/slides/slide17.xml><?xml version="1.0" encoding="utf-8"?>
 <p:sld xmlns:a="http://schemas.openxmlformats.org/drawingml/2006/main" xmlns:r="http://schemas.openxmlformats.org/officeDocument/2006/relationships" xmlns:p="http://schemas.openxmlformats.org/presentationml/2006/main">
   <p:cSld>
     <p:spTree>
@@ -38524,7 +41159,7 @@
                   <a:spcPts val="600"/>
                 </a:spcAft>
               </a:pPr>
-              <a:t>15</a:t>
+              <a:t>17</a:t>
             </a:fld>
             <a:endParaRPr lang="en-US"/>
           </a:p>
@@ -38808,7 +41443,7 @@
 </p:sld>
 </file>
 
-<file path=ppt/slides/slide16.xml><?xml version="1.0" encoding="utf-8"?>
+<file path=ppt/slides/slide18.xml><?xml version="1.0" encoding="utf-8"?>
 <p:sld xmlns:a="http://schemas.openxmlformats.org/drawingml/2006/main" xmlns:r="http://schemas.openxmlformats.org/officeDocument/2006/relationships" xmlns:p="http://schemas.openxmlformats.org/presentationml/2006/main">
   <p:cSld>
     <p:spTree>
@@ -39001,7 +41636,7 @@
           <a:p>
             <a:fld id="{A65A5C87-DF58-40C8-B092-1DE63DB4547E}" type="slidenum">
               <a:rPr lang="en-US" smtClean="0"/>
-              <a:t>16</a:t>
+              <a:t>18</a:t>
             </a:fld>
             <a:endParaRPr lang="en-US"/>
           </a:p>
@@ -39020,7 +41655,7 @@
 </p:sld>
 </file>
 
-<file path=ppt/slides/slide17.xml><?xml version="1.0" encoding="utf-8"?>
+<file path=ppt/slides/slide19.xml><?xml version="1.0" encoding="utf-8"?>
 <p:sld xmlns:a="http://schemas.openxmlformats.org/drawingml/2006/main" xmlns:r="http://schemas.openxmlformats.org/officeDocument/2006/relationships" xmlns:p="http://schemas.openxmlformats.org/presentationml/2006/main">
   <p:cSld>
     <p:bg>
@@ -39207,7 +41842,7 @@
                   <a:spcPts val="600"/>
                 </a:spcAft>
               </a:pPr>
-              <a:t>17</a:t>
+              <a:t>19</a:t>
             </a:fld>
             <a:endParaRPr lang="en-US"/>
           </a:p>
@@ -39248,684 +41883,6 @@
     <p:extLst>
       <p:ext uri="{BB962C8B-B14F-4D97-AF65-F5344CB8AC3E}">
         <p14:creationId xmlns:p14="http://schemas.microsoft.com/office/powerpoint/2010/main" val="3119259194"/>
-      </p:ext>
-    </p:extLst>
-  </p:cSld>
-  <p:clrMapOvr>
-    <a:masterClrMapping/>
-  </p:clrMapOvr>
-</p:sld>
-</file>
-
-<file path=ppt/slides/slide18.xml><?xml version="1.0" encoding="utf-8"?>
-<p:sld xmlns:a="http://schemas.openxmlformats.org/drawingml/2006/main" xmlns:r="http://schemas.openxmlformats.org/officeDocument/2006/relationships" xmlns:p="http://schemas.openxmlformats.org/presentationml/2006/main">
-  <p:cSld>
-    <p:bg>
-      <p:bgPr>
-        <a:solidFill>
-          <a:schemeClr val="bg1"/>
-        </a:solidFill>
-        <a:effectLst/>
-      </p:bgPr>
-    </p:bg>
-    <p:spTree>
-      <p:nvGrpSpPr>
-        <p:cNvPr id="1" name="">
-          <a:extLst>
-            <a:ext uri="{FF2B5EF4-FFF2-40B4-BE49-F238E27FC236}">
-              <a16:creationId xmlns:a16="http://schemas.microsoft.com/office/drawing/2014/main" id="{7ED70B3F-F690-B0FD-D48C-C12F05772B88}"/>
-            </a:ext>
-          </a:extLst>
-        </p:cNvPr>
-        <p:cNvGrpSpPr/>
-        <p:nvPr/>
-      </p:nvGrpSpPr>
-      <p:grpSpPr>
-        <a:xfrm>
-          <a:off x="0" y="0"/>
-          <a:ext cx="0" cy="0"/>
-          <a:chOff x="0" y="0"/>
-          <a:chExt cx="0" cy="0"/>
-        </a:xfrm>
-      </p:grpSpPr>
-      <p:sp useBgFill="1">
-        <p:nvSpPr>
-          <p:cNvPr id="12" name="Rectangle 11">
-            <a:extLst>
-              <a:ext uri="{FF2B5EF4-FFF2-40B4-BE49-F238E27FC236}">
-                <a16:creationId xmlns:a16="http://schemas.microsoft.com/office/drawing/2014/main" id="{83529AFD-5A84-4419-9390-0E9584F35DC8}"/>
-              </a:ext>
-              <a:ext uri="{C183D7F6-B498-43B3-948B-1728B52AA6E4}">
-                <adec:decorative xmlns:adec="http://schemas.microsoft.com/office/drawing/2017/decorative" val="1"/>
-              </a:ext>
-            </a:extLst>
-          </p:cNvPr>
-          <p:cNvSpPr>
-            <a:spLocks noGrp="1" noRot="1" noChangeAspect="1" noMove="1" noResize="1" noEditPoints="1" noAdjustHandles="1" noChangeArrowheads="1" noChangeShapeType="1" noTextEdit="1"/>
-          </p:cNvSpPr>
-          <p:nvPr>
-            <p:extLst>
-              <p:ext uri="{386F3935-93C4-4BCD-93E2-E3B085C9AB24}">
-                <p16:designElem xmlns:p16="http://schemas.microsoft.com/office/powerpoint/2015/main" val="1"/>
-              </p:ext>
-            </p:extLst>
-          </p:nvPr>
-        </p:nvSpPr>
-        <p:spPr>
-          <a:xfrm>
-            <a:off x="0" y="0"/>
-            <a:ext cx="12186315" cy="6858000"/>
-          </a:xfrm>
-          <a:prstGeom prst="rect">
-            <a:avLst/>
-          </a:prstGeom>
-          <a:ln>
-            <a:noFill/>
-          </a:ln>
-        </p:spPr>
-        <p:style>
-          <a:lnRef idx="2">
-            <a:schemeClr val="accent6">
-              <a:shade val="50000"/>
-            </a:schemeClr>
-          </a:lnRef>
-          <a:fillRef idx="1001">
-            <a:schemeClr val="lt1"/>
-          </a:fillRef>
-          <a:effectRef idx="0">
-            <a:schemeClr val="accent6"/>
-          </a:effectRef>
-          <a:fontRef idx="minor">
-            <a:schemeClr val="lt1"/>
-          </a:fontRef>
-        </p:style>
-        <p:txBody>
-          <a:bodyPr rtlCol="0" anchor="ctr"/>
-          <a:lstStyle/>
-          <a:p>
-            <a:pPr algn="ctr"/>
-            <a:endParaRPr lang="en-US"/>
-          </a:p>
-        </p:txBody>
-      </p:sp>
-      <p:sp>
-        <p:nvSpPr>
-          <p:cNvPr id="14" name="Rectangle 13">
-            <a:extLst>
-              <a:ext uri="{FF2B5EF4-FFF2-40B4-BE49-F238E27FC236}">
-                <a16:creationId xmlns:a16="http://schemas.microsoft.com/office/drawing/2014/main" id="{D1FFD9C4-5E6D-4E44-8CCD-24EF7B6FF149}"/>
-              </a:ext>
-              <a:ext uri="{C183D7F6-B498-43B3-948B-1728B52AA6E4}">
-                <adec:decorative xmlns:adec="http://schemas.microsoft.com/office/drawing/2017/decorative" val="1"/>
-              </a:ext>
-            </a:extLst>
-          </p:cNvPr>
-          <p:cNvSpPr>
-            <a:spLocks noGrp="1" noRot="1" noChangeAspect="1" noMove="1" noResize="1" noEditPoints="1" noAdjustHandles="1" noChangeArrowheads="1" noChangeShapeType="1" noTextEdit="1"/>
-          </p:cNvSpPr>
-          <p:nvPr>
-            <p:extLst>
-              <p:ext uri="{386F3935-93C4-4BCD-93E2-E3B085C9AB24}">
-                <p16:designElem xmlns:p16="http://schemas.microsoft.com/office/powerpoint/2015/main" val="1"/>
-              </p:ext>
-            </p:extLst>
-          </p:nvPr>
-        </p:nvSpPr>
-        <p:spPr>
-          <a:xfrm>
-            <a:off x="16" y="0"/>
-            <a:ext cx="4050791" cy="6858000"/>
-          </a:xfrm>
-          <a:prstGeom prst="rect">
-            <a:avLst/>
-          </a:prstGeom>
-          <a:solidFill>
-            <a:schemeClr val="accent2"/>
-          </a:solidFill>
-          <a:ln>
-            <a:noFill/>
-          </a:ln>
-        </p:spPr>
-        <p:style>
-          <a:lnRef idx="2">
-            <a:schemeClr val="accent1">
-              <a:shade val="50000"/>
-            </a:schemeClr>
-          </a:lnRef>
-          <a:fillRef idx="1">
-            <a:schemeClr val="accent1"/>
-          </a:fillRef>
-          <a:effectRef idx="0">
-            <a:schemeClr val="accent1"/>
-          </a:effectRef>
-          <a:fontRef idx="minor">
-            <a:schemeClr val="lt1"/>
-          </a:fontRef>
-        </p:style>
-        <p:txBody>
-          <a:bodyPr/>
-          <a:lstStyle/>
-          <a:p>
-            <a:endParaRPr lang="en-GB"/>
-          </a:p>
-        </p:txBody>
-      </p:sp>
-      <p:sp>
-        <p:nvSpPr>
-          <p:cNvPr id="2" name="Title 1">
-            <a:extLst>
-              <a:ext uri="{FF2B5EF4-FFF2-40B4-BE49-F238E27FC236}">
-                <a16:creationId xmlns:a16="http://schemas.microsoft.com/office/drawing/2014/main" id="{C1B7F93F-26FB-2005-B378-F6AAFC4F64C6}"/>
-              </a:ext>
-            </a:extLst>
-          </p:cNvPr>
-          <p:cNvSpPr>
-            <a:spLocks noGrp="1"/>
-          </p:cNvSpPr>
-          <p:nvPr>
-            <p:ph type="title"/>
-          </p:nvPr>
-        </p:nvSpPr>
-        <p:spPr>
-          <a:xfrm>
-            <a:off x="492370" y="516835"/>
-            <a:ext cx="3084844" cy="5772840"/>
-          </a:xfrm>
-        </p:spPr>
-        <p:txBody>
-          <a:bodyPr anchor="ctr">
-            <a:normAutofit/>
-          </a:bodyPr>
-          <a:lstStyle/>
-          <a:p>
-            <a:r>
-              <a:rPr lang="en-US" sz="3600">
-                <a:solidFill>
-                  <a:srgbClr val="FFFFFF"/>
-                </a:solidFill>
-              </a:rPr>
-              <a:t>Some relevant elements from the Threat Modelling Manifesto</a:t>
-            </a:r>
-            <a:endParaRPr lang="en-GB" sz="3600">
-              <a:solidFill>
-                <a:srgbClr val="FFFFFF"/>
-              </a:solidFill>
-            </a:endParaRPr>
-          </a:p>
-        </p:txBody>
-      </p:sp>
-      <p:sp>
-        <p:nvSpPr>
-          <p:cNvPr id="16" name="Rectangle 15">
-            <a:extLst>
-              <a:ext uri="{FF2B5EF4-FFF2-40B4-BE49-F238E27FC236}">
-                <a16:creationId xmlns:a16="http://schemas.microsoft.com/office/drawing/2014/main" id="{6B3B2DB5-1B01-4A7A-B79B-E180757E6145}"/>
-              </a:ext>
-              <a:ext uri="{C183D7F6-B498-43B3-948B-1728B52AA6E4}">
-                <adec:decorative xmlns:adec="http://schemas.microsoft.com/office/drawing/2017/decorative" val="1"/>
-              </a:ext>
-            </a:extLst>
-          </p:cNvPr>
-          <p:cNvSpPr>
-            <a:spLocks noGrp="1" noRot="1" noChangeAspect="1" noMove="1" noResize="1" noEditPoints="1" noAdjustHandles="1" noChangeArrowheads="1" noChangeShapeType="1" noTextEdit="1"/>
-          </p:cNvSpPr>
-          <p:nvPr>
-            <p:extLst>
-              <p:ext uri="{386F3935-93C4-4BCD-93E2-E3B085C9AB24}">
-                <p16:designElem xmlns:p16="http://schemas.microsoft.com/office/powerpoint/2015/main" val="1"/>
-              </p:ext>
-            </p:extLst>
-          </p:nvPr>
-        </p:nvSpPr>
-        <p:spPr>
-          <a:xfrm>
-            <a:off x="4040071" y="0"/>
-            <a:ext cx="64008" cy="6858000"/>
-          </a:xfrm>
-          <a:prstGeom prst="rect">
-            <a:avLst/>
-          </a:prstGeom>
-          <a:solidFill>
-            <a:schemeClr val="accent1"/>
-          </a:solidFill>
-          <a:ln>
-            <a:noFill/>
-          </a:ln>
-        </p:spPr>
-        <p:style>
-          <a:lnRef idx="2">
-            <a:schemeClr val="accent1">
-              <a:shade val="50000"/>
-            </a:schemeClr>
-          </a:lnRef>
-          <a:fillRef idx="1">
-            <a:schemeClr val="accent1"/>
-          </a:fillRef>
-          <a:effectRef idx="0">
-            <a:schemeClr val="accent1"/>
-          </a:effectRef>
-          <a:fontRef idx="minor">
-            <a:schemeClr val="lt1"/>
-          </a:fontRef>
-        </p:style>
-        <p:txBody>
-          <a:bodyPr/>
-          <a:lstStyle/>
-          <a:p>
-            <a:endParaRPr lang="en-GB"/>
-          </a:p>
-        </p:txBody>
-      </p:sp>
-      <p:sp>
-        <p:nvSpPr>
-          <p:cNvPr id="4" name="Date Placeholder 3">
-            <a:extLst>
-              <a:ext uri="{FF2B5EF4-FFF2-40B4-BE49-F238E27FC236}">
-                <a16:creationId xmlns:a16="http://schemas.microsoft.com/office/drawing/2014/main" id="{FE985AEC-0380-CFE9-9400-910932CC1825}"/>
-              </a:ext>
-            </a:extLst>
-          </p:cNvPr>
-          <p:cNvSpPr>
-            <a:spLocks noGrp="1"/>
-          </p:cNvSpPr>
-          <p:nvPr>
-            <p:ph type="dt" sz="half" idx="10"/>
-          </p:nvPr>
-        </p:nvSpPr>
-        <p:spPr>
-          <a:xfrm>
-            <a:off x="492370" y="6459785"/>
-            <a:ext cx="1735371" cy="365125"/>
-          </a:xfrm>
-        </p:spPr>
-        <p:txBody>
-          <a:bodyPr>
-            <a:normAutofit/>
-          </a:bodyPr>
-          <a:lstStyle/>
-          <a:p>
-            <a:pPr>
-              <a:spcAft>
-                <a:spcPts val="600"/>
-              </a:spcAft>
-            </a:pPr>
-            <a:r>
-              <a:rPr lang="en-US"/>
-              <a:t>16 August 2025</a:t>
-            </a:r>
-          </a:p>
-        </p:txBody>
-      </p:sp>
-      <p:sp>
-        <p:nvSpPr>
-          <p:cNvPr id="5" name="Footer Placeholder 4">
-            <a:extLst>
-              <a:ext uri="{FF2B5EF4-FFF2-40B4-BE49-F238E27FC236}">
-                <a16:creationId xmlns:a16="http://schemas.microsoft.com/office/drawing/2014/main" id="{25D33F22-72D9-50AD-62EB-2D221EA9A3D6}"/>
-              </a:ext>
-            </a:extLst>
-          </p:cNvPr>
-          <p:cNvSpPr>
-            <a:spLocks noGrp="1"/>
-          </p:cNvSpPr>
-          <p:nvPr>
-            <p:ph type="ftr" sz="quarter" idx="11"/>
-          </p:nvPr>
-        </p:nvSpPr>
-        <p:spPr>
-          <a:xfrm>
-            <a:off x="4742017" y="6459785"/>
-            <a:ext cx="5105169" cy="365125"/>
-          </a:xfrm>
-        </p:spPr>
-        <p:txBody>
-          <a:bodyPr>
-            <a:normAutofit/>
-          </a:bodyPr>
-          <a:lstStyle/>
-          <a:p>
-            <a:pPr algn="l">
-              <a:spcAft>
-                <a:spcPts val="600"/>
-              </a:spcAft>
-            </a:pPr>
-            <a:r>
-              <a:rPr lang="en-US">
-                <a:solidFill>
-                  <a:schemeClr val="tx2"/>
-                </a:solidFill>
-              </a:rPr>
-              <a:t>BSides Bournemouth 2025</a:t>
-            </a:r>
-          </a:p>
-        </p:txBody>
-      </p:sp>
-      <p:sp>
-        <p:nvSpPr>
-          <p:cNvPr id="6" name="Slide Number Placeholder 5">
-            <a:extLst>
-              <a:ext uri="{FF2B5EF4-FFF2-40B4-BE49-F238E27FC236}">
-                <a16:creationId xmlns:a16="http://schemas.microsoft.com/office/drawing/2014/main" id="{CC4CF3F9-B931-2EDD-7610-AC739B371974}"/>
-              </a:ext>
-            </a:extLst>
-          </p:cNvPr>
-          <p:cNvSpPr>
-            <a:spLocks noGrp="1"/>
-          </p:cNvSpPr>
-          <p:nvPr>
-            <p:ph type="sldNum" sz="quarter" idx="12"/>
-          </p:nvPr>
-        </p:nvSpPr>
-        <p:spPr>
-          <a:xfrm>
-            <a:off x="10123055" y="6459785"/>
-            <a:ext cx="1089428" cy="365125"/>
-          </a:xfrm>
-        </p:spPr>
-        <p:txBody>
-          <a:bodyPr>
-            <a:normAutofit/>
-          </a:bodyPr>
-          <a:lstStyle/>
-          <a:p>
-            <a:pPr>
-              <a:spcAft>
-                <a:spcPts val="600"/>
-              </a:spcAft>
-            </a:pPr>
-            <a:fld id="{A65A5C87-DF58-40C8-B092-1DE63DB4547E}" type="slidenum">
-              <a:rPr lang="en-US">
-                <a:solidFill>
-                  <a:schemeClr val="tx2"/>
-                </a:solidFill>
-              </a:rPr>
-              <a:pPr>
-                <a:spcAft>
-                  <a:spcPts val="600"/>
-                </a:spcAft>
-              </a:pPr>
-              <a:t>18</a:t>
-            </a:fld>
-            <a:endParaRPr lang="en-US">
-              <a:solidFill>
-                <a:schemeClr val="tx2"/>
-              </a:solidFill>
-            </a:endParaRPr>
-          </a:p>
-        </p:txBody>
-      </p:sp>
-      <p:graphicFrame>
-        <p:nvGraphicFramePr>
-          <p:cNvPr id="8" name="Content Placeholder 2">
-            <a:extLst>
-              <a:ext uri="{FF2B5EF4-FFF2-40B4-BE49-F238E27FC236}">
-                <a16:creationId xmlns:a16="http://schemas.microsoft.com/office/drawing/2014/main" id="{D906915F-200A-B387-2A6F-79FB9E21CAFF}"/>
-              </a:ext>
-            </a:extLst>
-          </p:cNvPr>
-          <p:cNvGraphicFramePr>
-            <a:graphicFrameLocks noGrp="1"/>
-          </p:cNvGraphicFramePr>
-          <p:nvPr>
-            <p:ph idx="1"/>
-            <p:extLst>
-              <p:ext uri="{D42A27DB-BD31-4B8C-83A1-F6EECF244321}">
-                <p14:modId xmlns:p14="http://schemas.microsoft.com/office/powerpoint/2010/main" val="1558737954"/>
-              </p:ext>
-            </p:extLst>
-          </p:nvPr>
-        </p:nvGraphicFramePr>
-        <p:xfrm>
-          <a:off x="4741863" y="639763"/>
-          <a:ext cx="6797675" cy="5649912"/>
-        </p:xfrm>
-        <a:graphic>
-          <a:graphicData uri="http://schemas.openxmlformats.org/drawingml/2006/diagram">
-            <dgm:relIds xmlns:dgm="http://schemas.openxmlformats.org/drawingml/2006/diagram" xmlns:r="http://schemas.openxmlformats.org/officeDocument/2006/relationships" r:dm="rId3" r:lo="rId4" r:qs="rId5" r:cs="rId6"/>
-          </a:graphicData>
-        </a:graphic>
-      </p:graphicFrame>
-    </p:spTree>
-    <p:extLst>
-      <p:ext uri="{BB962C8B-B14F-4D97-AF65-F5344CB8AC3E}">
-        <p14:creationId xmlns:p14="http://schemas.microsoft.com/office/powerpoint/2010/main" val="2042914780"/>
-      </p:ext>
-    </p:extLst>
-  </p:cSld>
-  <p:clrMapOvr>
-    <a:masterClrMapping/>
-  </p:clrMapOvr>
-</p:sld>
-</file>
-
-<file path=ppt/slides/slide19.xml><?xml version="1.0" encoding="utf-8"?>
-<p:sld xmlns:a="http://schemas.openxmlformats.org/drawingml/2006/main" xmlns:r="http://schemas.openxmlformats.org/officeDocument/2006/relationships" xmlns:p="http://schemas.openxmlformats.org/presentationml/2006/main">
-  <p:cSld>
-    <p:bg>
-      <p:bgPr>
-        <a:solidFill>
-          <a:schemeClr val="bg1"/>
-        </a:solidFill>
-        <a:effectLst/>
-      </p:bgPr>
-    </p:bg>
-    <p:spTree>
-      <p:nvGrpSpPr>
-        <p:cNvPr id="1" name="">
-          <a:extLst>
-            <a:ext uri="{FF2B5EF4-FFF2-40B4-BE49-F238E27FC236}">
-              <a16:creationId xmlns:a16="http://schemas.microsoft.com/office/drawing/2014/main" id="{A7B85E19-39C0-D3AA-A966-543815495375}"/>
-            </a:ext>
-          </a:extLst>
-        </p:cNvPr>
-        <p:cNvGrpSpPr/>
-        <p:nvPr/>
-      </p:nvGrpSpPr>
-      <p:grpSpPr>
-        <a:xfrm>
-          <a:off x="0" y="0"/>
-          <a:ext cx="0" cy="0"/>
-          <a:chOff x="0" y="0"/>
-          <a:chExt cx="0" cy="0"/>
-        </a:xfrm>
-      </p:grpSpPr>
-      <p:sp>
-        <p:nvSpPr>
-          <p:cNvPr id="2" name="Title 1">
-            <a:extLst>
-              <a:ext uri="{FF2B5EF4-FFF2-40B4-BE49-F238E27FC236}">
-                <a16:creationId xmlns:a16="http://schemas.microsoft.com/office/drawing/2014/main" id="{02677709-82DC-CB56-D8ED-AEED69641A0A}"/>
-              </a:ext>
-            </a:extLst>
-          </p:cNvPr>
-          <p:cNvSpPr>
-            <a:spLocks noGrp="1"/>
-          </p:cNvSpPr>
-          <p:nvPr>
-            <p:ph type="title"/>
-          </p:nvPr>
-        </p:nvSpPr>
-        <p:spPr>
-          <a:xfrm>
-            <a:off x="1097280" y="286603"/>
-            <a:ext cx="10058400" cy="677901"/>
-          </a:xfrm>
-        </p:spPr>
-        <p:txBody>
-          <a:bodyPr>
-            <a:normAutofit fontScale="90000"/>
-          </a:bodyPr>
-          <a:lstStyle/>
-          <a:p>
-            <a:r>
-              <a:rPr lang="en-US" dirty="0"/>
-              <a:t>Resources for Creating Templates</a:t>
-            </a:r>
-            <a:endParaRPr lang="en-GB" dirty="0"/>
-          </a:p>
-        </p:txBody>
-      </p:sp>
-      <p:sp>
-        <p:nvSpPr>
-          <p:cNvPr id="5" name="Date Placeholder 4">
-            <a:extLst>
-              <a:ext uri="{FF2B5EF4-FFF2-40B4-BE49-F238E27FC236}">
-                <a16:creationId xmlns:a16="http://schemas.microsoft.com/office/drawing/2014/main" id="{669D6721-1462-F4CD-FBBE-54B5596C44C1}"/>
-              </a:ext>
-            </a:extLst>
-          </p:cNvPr>
-          <p:cNvSpPr>
-            <a:spLocks noGrp="1"/>
-          </p:cNvSpPr>
-          <p:nvPr>
-            <p:ph type="dt" sz="half" idx="10"/>
-          </p:nvPr>
-        </p:nvSpPr>
-        <p:spPr>
-          <a:xfrm>
-            <a:off x="1097280" y="6459785"/>
-            <a:ext cx="2472271" cy="365125"/>
-          </a:xfrm>
-        </p:spPr>
-        <p:txBody>
-          <a:bodyPr>
-            <a:normAutofit/>
-          </a:bodyPr>
-          <a:lstStyle/>
-          <a:p>
-            <a:pPr>
-              <a:spcAft>
-                <a:spcPts val="600"/>
-              </a:spcAft>
-            </a:pPr>
-            <a:r>
-              <a:rPr lang="en-US"/>
-              <a:t>16 August 2025</a:t>
-            </a:r>
-          </a:p>
-        </p:txBody>
-      </p:sp>
-      <p:sp>
-        <p:nvSpPr>
-          <p:cNvPr id="13" name="Footer Placeholder 5">
-            <a:extLst>
-              <a:ext uri="{FF2B5EF4-FFF2-40B4-BE49-F238E27FC236}">
-                <a16:creationId xmlns:a16="http://schemas.microsoft.com/office/drawing/2014/main" id="{0E9ABC5F-2E62-43BA-33E0-090E628707E8}"/>
-              </a:ext>
-            </a:extLst>
-          </p:cNvPr>
-          <p:cNvSpPr>
-            <a:spLocks noGrp="1"/>
-          </p:cNvSpPr>
-          <p:nvPr>
-            <p:ph type="ftr" sz="quarter" idx="11"/>
-          </p:nvPr>
-        </p:nvSpPr>
-        <p:spPr>
-          <a:xfrm>
-            <a:off x="3686185" y="6459785"/>
-            <a:ext cx="4822804" cy="365125"/>
-          </a:xfrm>
-        </p:spPr>
-        <p:txBody>
-          <a:bodyPr>
-            <a:normAutofit/>
-          </a:bodyPr>
-          <a:lstStyle/>
-          <a:p>
-            <a:pPr>
-              <a:spcAft>
-                <a:spcPts val="600"/>
-              </a:spcAft>
-            </a:pPr>
-            <a:r>
-              <a:rPr lang="en-US"/>
-              <a:t>BSides Bournemouth 2025</a:t>
-            </a:r>
-          </a:p>
-        </p:txBody>
-      </p:sp>
-      <p:sp>
-        <p:nvSpPr>
-          <p:cNvPr id="7" name="Slide Number Placeholder 6">
-            <a:extLst>
-              <a:ext uri="{FF2B5EF4-FFF2-40B4-BE49-F238E27FC236}">
-                <a16:creationId xmlns:a16="http://schemas.microsoft.com/office/drawing/2014/main" id="{F506F1CD-72F8-1476-CD8F-FC68DDD4B04B}"/>
-              </a:ext>
-            </a:extLst>
-          </p:cNvPr>
-          <p:cNvSpPr>
-            <a:spLocks noGrp="1"/>
-          </p:cNvSpPr>
-          <p:nvPr>
-            <p:ph type="sldNum" sz="quarter" idx="12"/>
-          </p:nvPr>
-        </p:nvSpPr>
-        <p:spPr>
-          <a:xfrm>
-            <a:off x="9900458" y="6459785"/>
-            <a:ext cx="1312025" cy="365125"/>
-          </a:xfrm>
-        </p:spPr>
-        <p:txBody>
-          <a:bodyPr>
-            <a:normAutofit/>
-          </a:bodyPr>
-          <a:lstStyle/>
-          <a:p>
-            <a:pPr>
-              <a:spcAft>
-                <a:spcPts val="600"/>
-              </a:spcAft>
-            </a:pPr>
-            <a:fld id="{A65A5C87-DF58-40C8-B092-1DE63DB4547E}" type="slidenum">
-              <a:rPr lang="en-US"/>
-              <a:pPr>
-                <a:spcAft>
-                  <a:spcPts val="600"/>
-                </a:spcAft>
-              </a:pPr>
-              <a:t>19</a:t>
-            </a:fld>
-            <a:endParaRPr lang="en-US"/>
-          </a:p>
-        </p:txBody>
-      </p:sp>
-      <p:graphicFrame>
-        <p:nvGraphicFramePr>
-          <p:cNvPr id="15" name="Content Placeholder 5">
-            <a:extLst>
-              <a:ext uri="{FF2B5EF4-FFF2-40B4-BE49-F238E27FC236}">
-                <a16:creationId xmlns:a16="http://schemas.microsoft.com/office/drawing/2014/main" id="{6F5A690E-0C0D-FA1D-C6B6-10A107748D28}"/>
-              </a:ext>
-            </a:extLst>
-          </p:cNvPr>
-          <p:cNvGraphicFramePr>
-            <a:graphicFrameLocks noGrp="1"/>
-          </p:cNvGraphicFramePr>
-          <p:nvPr>
-            <p:ph idx="1"/>
-            <p:extLst>
-              <p:ext uri="{D42A27DB-BD31-4B8C-83A1-F6EECF244321}">
-                <p14:modId xmlns:p14="http://schemas.microsoft.com/office/powerpoint/2010/main" val="1280027354"/>
-              </p:ext>
-            </p:extLst>
-          </p:nvPr>
-        </p:nvGraphicFramePr>
-        <p:xfrm>
-          <a:off x="306888" y="1052186"/>
-          <a:ext cx="11580311" cy="3068877"/>
-        </p:xfrm>
-        <a:graphic>
-          <a:graphicData uri="http://schemas.openxmlformats.org/drawingml/2006/diagram">
-            <dgm:relIds xmlns:dgm="http://schemas.openxmlformats.org/drawingml/2006/diagram" xmlns:r="http://schemas.openxmlformats.org/officeDocument/2006/relationships" r:dm="rId3" r:lo="rId4" r:qs="rId5" r:cs="rId6"/>
-          </a:graphicData>
-        </a:graphic>
-      </p:graphicFrame>
-    </p:spTree>
-    <p:extLst>
-      <p:ext uri="{BB962C8B-B14F-4D97-AF65-F5344CB8AC3E}">
-        <p14:creationId xmlns:p14="http://schemas.microsoft.com/office/powerpoint/2010/main" val="4287369654"/>
       </p:ext>
     </p:extLst>
   </p:cSld>
@@ -40422,6 +42379,684 @@
 <file path=ppt/slides/slide20.xml><?xml version="1.0" encoding="utf-8"?>
 <p:sld xmlns:a="http://schemas.openxmlformats.org/drawingml/2006/main" xmlns:r="http://schemas.openxmlformats.org/officeDocument/2006/relationships" xmlns:p="http://schemas.openxmlformats.org/presentationml/2006/main">
   <p:cSld>
+    <p:bg>
+      <p:bgPr>
+        <a:solidFill>
+          <a:schemeClr val="bg1"/>
+        </a:solidFill>
+        <a:effectLst/>
+      </p:bgPr>
+    </p:bg>
+    <p:spTree>
+      <p:nvGrpSpPr>
+        <p:cNvPr id="1" name="">
+          <a:extLst>
+            <a:ext uri="{FF2B5EF4-FFF2-40B4-BE49-F238E27FC236}">
+              <a16:creationId xmlns:a16="http://schemas.microsoft.com/office/drawing/2014/main" id="{7ED70B3F-F690-B0FD-D48C-C12F05772B88}"/>
+            </a:ext>
+          </a:extLst>
+        </p:cNvPr>
+        <p:cNvGrpSpPr/>
+        <p:nvPr/>
+      </p:nvGrpSpPr>
+      <p:grpSpPr>
+        <a:xfrm>
+          <a:off x="0" y="0"/>
+          <a:ext cx="0" cy="0"/>
+          <a:chOff x="0" y="0"/>
+          <a:chExt cx="0" cy="0"/>
+        </a:xfrm>
+      </p:grpSpPr>
+      <p:sp useBgFill="1">
+        <p:nvSpPr>
+          <p:cNvPr id="12" name="Rectangle 11">
+            <a:extLst>
+              <a:ext uri="{FF2B5EF4-FFF2-40B4-BE49-F238E27FC236}">
+                <a16:creationId xmlns:a16="http://schemas.microsoft.com/office/drawing/2014/main" id="{83529AFD-5A84-4419-9390-0E9584F35DC8}"/>
+              </a:ext>
+              <a:ext uri="{C183D7F6-B498-43B3-948B-1728B52AA6E4}">
+                <adec:decorative xmlns:adec="http://schemas.microsoft.com/office/drawing/2017/decorative" val="1"/>
+              </a:ext>
+            </a:extLst>
+          </p:cNvPr>
+          <p:cNvSpPr>
+            <a:spLocks noGrp="1" noRot="1" noChangeAspect="1" noMove="1" noResize="1" noEditPoints="1" noAdjustHandles="1" noChangeArrowheads="1" noChangeShapeType="1" noTextEdit="1"/>
+          </p:cNvSpPr>
+          <p:nvPr>
+            <p:extLst>
+              <p:ext uri="{386F3935-93C4-4BCD-93E2-E3B085C9AB24}">
+                <p16:designElem xmlns:p16="http://schemas.microsoft.com/office/powerpoint/2015/main" val="1"/>
+              </p:ext>
+            </p:extLst>
+          </p:nvPr>
+        </p:nvSpPr>
+        <p:spPr>
+          <a:xfrm>
+            <a:off x="0" y="0"/>
+            <a:ext cx="12186315" cy="6858000"/>
+          </a:xfrm>
+          <a:prstGeom prst="rect">
+            <a:avLst/>
+          </a:prstGeom>
+          <a:ln>
+            <a:noFill/>
+          </a:ln>
+        </p:spPr>
+        <p:style>
+          <a:lnRef idx="2">
+            <a:schemeClr val="accent6">
+              <a:shade val="50000"/>
+            </a:schemeClr>
+          </a:lnRef>
+          <a:fillRef idx="1001">
+            <a:schemeClr val="lt1"/>
+          </a:fillRef>
+          <a:effectRef idx="0">
+            <a:schemeClr val="accent6"/>
+          </a:effectRef>
+          <a:fontRef idx="minor">
+            <a:schemeClr val="lt1"/>
+          </a:fontRef>
+        </p:style>
+        <p:txBody>
+          <a:bodyPr rtlCol="0" anchor="ctr"/>
+          <a:lstStyle/>
+          <a:p>
+            <a:pPr algn="ctr"/>
+            <a:endParaRPr lang="en-US"/>
+          </a:p>
+        </p:txBody>
+      </p:sp>
+      <p:sp>
+        <p:nvSpPr>
+          <p:cNvPr id="14" name="Rectangle 13">
+            <a:extLst>
+              <a:ext uri="{FF2B5EF4-FFF2-40B4-BE49-F238E27FC236}">
+                <a16:creationId xmlns:a16="http://schemas.microsoft.com/office/drawing/2014/main" id="{D1FFD9C4-5E6D-4E44-8CCD-24EF7B6FF149}"/>
+              </a:ext>
+              <a:ext uri="{C183D7F6-B498-43B3-948B-1728B52AA6E4}">
+                <adec:decorative xmlns:adec="http://schemas.microsoft.com/office/drawing/2017/decorative" val="1"/>
+              </a:ext>
+            </a:extLst>
+          </p:cNvPr>
+          <p:cNvSpPr>
+            <a:spLocks noGrp="1" noRot="1" noChangeAspect="1" noMove="1" noResize="1" noEditPoints="1" noAdjustHandles="1" noChangeArrowheads="1" noChangeShapeType="1" noTextEdit="1"/>
+          </p:cNvSpPr>
+          <p:nvPr>
+            <p:extLst>
+              <p:ext uri="{386F3935-93C4-4BCD-93E2-E3B085C9AB24}">
+                <p16:designElem xmlns:p16="http://schemas.microsoft.com/office/powerpoint/2015/main" val="1"/>
+              </p:ext>
+            </p:extLst>
+          </p:nvPr>
+        </p:nvSpPr>
+        <p:spPr>
+          <a:xfrm>
+            <a:off x="16" y="0"/>
+            <a:ext cx="4050791" cy="6858000"/>
+          </a:xfrm>
+          <a:prstGeom prst="rect">
+            <a:avLst/>
+          </a:prstGeom>
+          <a:solidFill>
+            <a:schemeClr val="accent2"/>
+          </a:solidFill>
+          <a:ln>
+            <a:noFill/>
+          </a:ln>
+        </p:spPr>
+        <p:style>
+          <a:lnRef idx="2">
+            <a:schemeClr val="accent1">
+              <a:shade val="50000"/>
+            </a:schemeClr>
+          </a:lnRef>
+          <a:fillRef idx="1">
+            <a:schemeClr val="accent1"/>
+          </a:fillRef>
+          <a:effectRef idx="0">
+            <a:schemeClr val="accent1"/>
+          </a:effectRef>
+          <a:fontRef idx="minor">
+            <a:schemeClr val="lt1"/>
+          </a:fontRef>
+        </p:style>
+        <p:txBody>
+          <a:bodyPr/>
+          <a:lstStyle/>
+          <a:p>
+            <a:endParaRPr lang="en-GB"/>
+          </a:p>
+        </p:txBody>
+      </p:sp>
+      <p:sp>
+        <p:nvSpPr>
+          <p:cNvPr id="2" name="Title 1">
+            <a:extLst>
+              <a:ext uri="{FF2B5EF4-FFF2-40B4-BE49-F238E27FC236}">
+                <a16:creationId xmlns:a16="http://schemas.microsoft.com/office/drawing/2014/main" id="{C1B7F93F-26FB-2005-B378-F6AAFC4F64C6}"/>
+              </a:ext>
+            </a:extLst>
+          </p:cNvPr>
+          <p:cNvSpPr>
+            <a:spLocks noGrp="1"/>
+          </p:cNvSpPr>
+          <p:nvPr>
+            <p:ph type="title"/>
+          </p:nvPr>
+        </p:nvSpPr>
+        <p:spPr>
+          <a:xfrm>
+            <a:off x="492370" y="516835"/>
+            <a:ext cx="3084844" cy="5772840"/>
+          </a:xfrm>
+        </p:spPr>
+        <p:txBody>
+          <a:bodyPr anchor="ctr">
+            <a:normAutofit/>
+          </a:bodyPr>
+          <a:lstStyle/>
+          <a:p>
+            <a:r>
+              <a:rPr lang="en-US" sz="3600">
+                <a:solidFill>
+                  <a:srgbClr val="FFFFFF"/>
+                </a:solidFill>
+              </a:rPr>
+              <a:t>Some relevant elements from the Threat Modelling Manifesto</a:t>
+            </a:r>
+            <a:endParaRPr lang="en-GB" sz="3600">
+              <a:solidFill>
+                <a:srgbClr val="FFFFFF"/>
+              </a:solidFill>
+            </a:endParaRPr>
+          </a:p>
+        </p:txBody>
+      </p:sp>
+      <p:sp>
+        <p:nvSpPr>
+          <p:cNvPr id="16" name="Rectangle 15">
+            <a:extLst>
+              <a:ext uri="{FF2B5EF4-FFF2-40B4-BE49-F238E27FC236}">
+                <a16:creationId xmlns:a16="http://schemas.microsoft.com/office/drawing/2014/main" id="{6B3B2DB5-1B01-4A7A-B79B-E180757E6145}"/>
+              </a:ext>
+              <a:ext uri="{C183D7F6-B498-43B3-948B-1728B52AA6E4}">
+                <adec:decorative xmlns:adec="http://schemas.microsoft.com/office/drawing/2017/decorative" val="1"/>
+              </a:ext>
+            </a:extLst>
+          </p:cNvPr>
+          <p:cNvSpPr>
+            <a:spLocks noGrp="1" noRot="1" noChangeAspect="1" noMove="1" noResize="1" noEditPoints="1" noAdjustHandles="1" noChangeArrowheads="1" noChangeShapeType="1" noTextEdit="1"/>
+          </p:cNvSpPr>
+          <p:nvPr>
+            <p:extLst>
+              <p:ext uri="{386F3935-93C4-4BCD-93E2-E3B085C9AB24}">
+                <p16:designElem xmlns:p16="http://schemas.microsoft.com/office/powerpoint/2015/main" val="1"/>
+              </p:ext>
+            </p:extLst>
+          </p:nvPr>
+        </p:nvSpPr>
+        <p:spPr>
+          <a:xfrm>
+            <a:off x="4040071" y="0"/>
+            <a:ext cx="64008" cy="6858000"/>
+          </a:xfrm>
+          <a:prstGeom prst="rect">
+            <a:avLst/>
+          </a:prstGeom>
+          <a:solidFill>
+            <a:schemeClr val="accent1"/>
+          </a:solidFill>
+          <a:ln>
+            <a:noFill/>
+          </a:ln>
+        </p:spPr>
+        <p:style>
+          <a:lnRef idx="2">
+            <a:schemeClr val="accent1">
+              <a:shade val="50000"/>
+            </a:schemeClr>
+          </a:lnRef>
+          <a:fillRef idx="1">
+            <a:schemeClr val="accent1"/>
+          </a:fillRef>
+          <a:effectRef idx="0">
+            <a:schemeClr val="accent1"/>
+          </a:effectRef>
+          <a:fontRef idx="minor">
+            <a:schemeClr val="lt1"/>
+          </a:fontRef>
+        </p:style>
+        <p:txBody>
+          <a:bodyPr/>
+          <a:lstStyle/>
+          <a:p>
+            <a:endParaRPr lang="en-GB"/>
+          </a:p>
+        </p:txBody>
+      </p:sp>
+      <p:sp>
+        <p:nvSpPr>
+          <p:cNvPr id="4" name="Date Placeholder 3">
+            <a:extLst>
+              <a:ext uri="{FF2B5EF4-FFF2-40B4-BE49-F238E27FC236}">
+                <a16:creationId xmlns:a16="http://schemas.microsoft.com/office/drawing/2014/main" id="{FE985AEC-0380-CFE9-9400-910932CC1825}"/>
+              </a:ext>
+            </a:extLst>
+          </p:cNvPr>
+          <p:cNvSpPr>
+            <a:spLocks noGrp="1"/>
+          </p:cNvSpPr>
+          <p:nvPr>
+            <p:ph type="dt" sz="half" idx="10"/>
+          </p:nvPr>
+        </p:nvSpPr>
+        <p:spPr>
+          <a:xfrm>
+            <a:off x="492370" y="6459785"/>
+            <a:ext cx="1735371" cy="365125"/>
+          </a:xfrm>
+        </p:spPr>
+        <p:txBody>
+          <a:bodyPr>
+            <a:normAutofit/>
+          </a:bodyPr>
+          <a:lstStyle/>
+          <a:p>
+            <a:pPr>
+              <a:spcAft>
+                <a:spcPts val="600"/>
+              </a:spcAft>
+            </a:pPr>
+            <a:r>
+              <a:rPr lang="en-US"/>
+              <a:t>16 August 2025</a:t>
+            </a:r>
+          </a:p>
+        </p:txBody>
+      </p:sp>
+      <p:sp>
+        <p:nvSpPr>
+          <p:cNvPr id="5" name="Footer Placeholder 4">
+            <a:extLst>
+              <a:ext uri="{FF2B5EF4-FFF2-40B4-BE49-F238E27FC236}">
+                <a16:creationId xmlns:a16="http://schemas.microsoft.com/office/drawing/2014/main" id="{25D33F22-72D9-50AD-62EB-2D221EA9A3D6}"/>
+              </a:ext>
+            </a:extLst>
+          </p:cNvPr>
+          <p:cNvSpPr>
+            <a:spLocks noGrp="1"/>
+          </p:cNvSpPr>
+          <p:nvPr>
+            <p:ph type="ftr" sz="quarter" idx="11"/>
+          </p:nvPr>
+        </p:nvSpPr>
+        <p:spPr>
+          <a:xfrm>
+            <a:off x="4742017" y="6459785"/>
+            <a:ext cx="5105169" cy="365125"/>
+          </a:xfrm>
+        </p:spPr>
+        <p:txBody>
+          <a:bodyPr>
+            <a:normAutofit/>
+          </a:bodyPr>
+          <a:lstStyle/>
+          <a:p>
+            <a:pPr algn="l">
+              <a:spcAft>
+                <a:spcPts val="600"/>
+              </a:spcAft>
+            </a:pPr>
+            <a:r>
+              <a:rPr lang="en-US">
+                <a:solidFill>
+                  <a:schemeClr val="tx2"/>
+                </a:solidFill>
+              </a:rPr>
+              <a:t>BSides Bournemouth 2025</a:t>
+            </a:r>
+          </a:p>
+        </p:txBody>
+      </p:sp>
+      <p:sp>
+        <p:nvSpPr>
+          <p:cNvPr id="6" name="Slide Number Placeholder 5">
+            <a:extLst>
+              <a:ext uri="{FF2B5EF4-FFF2-40B4-BE49-F238E27FC236}">
+                <a16:creationId xmlns:a16="http://schemas.microsoft.com/office/drawing/2014/main" id="{CC4CF3F9-B931-2EDD-7610-AC739B371974}"/>
+              </a:ext>
+            </a:extLst>
+          </p:cNvPr>
+          <p:cNvSpPr>
+            <a:spLocks noGrp="1"/>
+          </p:cNvSpPr>
+          <p:nvPr>
+            <p:ph type="sldNum" sz="quarter" idx="12"/>
+          </p:nvPr>
+        </p:nvSpPr>
+        <p:spPr>
+          <a:xfrm>
+            <a:off x="10123055" y="6459785"/>
+            <a:ext cx="1089428" cy="365125"/>
+          </a:xfrm>
+        </p:spPr>
+        <p:txBody>
+          <a:bodyPr>
+            <a:normAutofit/>
+          </a:bodyPr>
+          <a:lstStyle/>
+          <a:p>
+            <a:pPr>
+              <a:spcAft>
+                <a:spcPts val="600"/>
+              </a:spcAft>
+            </a:pPr>
+            <a:fld id="{A65A5C87-DF58-40C8-B092-1DE63DB4547E}" type="slidenum">
+              <a:rPr lang="en-US">
+                <a:solidFill>
+                  <a:schemeClr val="tx2"/>
+                </a:solidFill>
+              </a:rPr>
+              <a:pPr>
+                <a:spcAft>
+                  <a:spcPts val="600"/>
+                </a:spcAft>
+              </a:pPr>
+              <a:t>20</a:t>
+            </a:fld>
+            <a:endParaRPr lang="en-US">
+              <a:solidFill>
+                <a:schemeClr val="tx2"/>
+              </a:solidFill>
+            </a:endParaRPr>
+          </a:p>
+        </p:txBody>
+      </p:sp>
+      <p:graphicFrame>
+        <p:nvGraphicFramePr>
+          <p:cNvPr id="8" name="Content Placeholder 2">
+            <a:extLst>
+              <a:ext uri="{FF2B5EF4-FFF2-40B4-BE49-F238E27FC236}">
+                <a16:creationId xmlns:a16="http://schemas.microsoft.com/office/drawing/2014/main" id="{D906915F-200A-B387-2A6F-79FB9E21CAFF}"/>
+              </a:ext>
+            </a:extLst>
+          </p:cNvPr>
+          <p:cNvGraphicFramePr>
+            <a:graphicFrameLocks noGrp="1"/>
+          </p:cNvGraphicFramePr>
+          <p:nvPr>
+            <p:ph idx="1"/>
+            <p:extLst>
+              <p:ext uri="{D42A27DB-BD31-4B8C-83A1-F6EECF244321}">
+                <p14:modId xmlns:p14="http://schemas.microsoft.com/office/powerpoint/2010/main" val="1558737954"/>
+              </p:ext>
+            </p:extLst>
+          </p:nvPr>
+        </p:nvGraphicFramePr>
+        <p:xfrm>
+          <a:off x="4741863" y="639763"/>
+          <a:ext cx="6797675" cy="5649912"/>
+        </p:xfrm>
+        <a:graphic>
+          <a:graphicData uri="http://schemas.openxmlformats.org/drawingml/2006/diagram">
+            <dgm:relIds xmlns:dgm="http://schemas.openxmlformats.org/drawingml/2006/diagram" xmlns:r="http://schemas.openxmlformats.org/officeDocument/2006/relationships" r:dm="rId3" r:lo="rId4" r:qs="rId5" r:cs="rId6"/>
+          </a:graphicData>
+        </a:graphic>
+      </p:graphicFrame>
+    </p:spTree>
+    <p:extLst>
+      <p:ext uri="{BB962C8B-B14F-4D97-AF65-F5344CB8AC3E}">
+        <p14:creationId xmlns:p14="http://schemas.microsoft.com/office/powerpoint/2010/main" val="2042914780"/>
+      </p:ext>
+    </p:extLst>
+  </p:cSld>
+  <p:clrMapOvr>
+    <a:masterClrMapping/>
+  </p:clrMapOvr>
+</p:sld>
+</file>
+
+<file path=ppt/slides/slide21.xml><?xml version="1.0" encoding="utf-8"?>
+<p:sld xmlns:a="http://schemas.openxmlformats.org/drawingml/2006/main" xmlns:r="http://schemas.openxmlformats.org/officeDocument/2006/relationships" xmlns:p="http://schemas.openxmlformats.org/presentationml/2006/main">
+  <p:cSld>
+    <p:bg>
+      <p:bgPr>
+        <a:solidFill>
+          <a:schemeClr val="bg1"/>
+        </a:solidFill>
+        <a:effectLst/>
+      </p:bgPr>
+    </p:bg>
+    <p:spTree>
+      <p:nvGrpSpPr>
+        <p:cNvPr id="1" name="">
+          <a:extLst>
+            <a:ext uri="{FF2B5EF4-FFF2-40B4-BE49-F238E27FC236}">
+              <a16:creationId xmlns:a16="http://schemas.microsoft.com/office/drawing/2014/main" id="{A7B85E19-39C0-D3AA-A966-543815495375}"/>
+            </a:ext>
+          </a:extLst>
+        </p:cNvPr>
+        <p:cNvGrpSpPr/>
+        <p:nvPr/>
+      </p:nvGrpSpPr>
+      <p:grpSpPr>
+        <a:xfrm>
+          <a:off x="0" y="0"/>
+          <a:ext cx="0" cy="0"/>
+          <a:chOff x="0" y="0"/>
+          <a:chExt cx="0" cy="0"/>
+        </a:xfrm>
+      </p:grpSpPr>
+      <p:sp>
+        <p:nvSpPr>
+          <p:cNvPr id="2" name="Title 1">
+            <a:extLst>
+              <a:ext uri="{FF2B5EF4-FFF2-40B4-BE49-F238E27FC236}">
+                <a16:creationId xmlns:a16="http://schemas.microsoft.com/office/drawing/2014/main" id="{02677709-82DC-CB56-D8ED-AEED69641A0A}"/>
+              </a:ext>
+            </a:extLst>
+          </p:cNvPr>
+          <p:cNvSpPr>
+            <a:spLocks noGrp="1"/>
+          </p:cNvSpPr>
+          <p:nvPr>
+            <p:ph type="title"/>
+          </p:nvPr>
+        </p:nvSpPr>
+        <p:spPr>
+          <a:xfrm>
+            <a:off x="1097280" y="286603"/>
+            <a:ext cx="10058400" cy="677901"/>
+          </a:xfrm>
+        </p:spPr>
+        <p:txBody>
+          <a:bodyPr>
+            <a:normAutofit fontScale="90000"/>
+          </a:bodyPr>
+          <a:lstStyle/>
+          <a:p>
+            <a:r>
+              <a:rPr lang="en-US" dirty="0"/>
+              <a:t>Resources for Creating Templates</a:t>
+            </a:r>
+            <a:endParaRPr lang="en-GB" dirty="0"/>
+          </a:p>
+        </p:txBody>
+      </p:sp>
+      <p:sp>
+        <p:nvSpPr>
+          <p:cNvPr id="5" name="Date Placeholder 4">
+            <a:extLst>
+              <a:ext uri="{FF2B5EF4-FFF2-40B4-BE49-F238E27FC236}">
+                <a16:creationId xmlns:a16="http://schemas.microsoft.com/office/drawing/2014/main" id="{669D6721-1462-F4CD-FBBE-54B5596C44C1}"/>
+              </a:ext>
+            </a:extLst>
+          </p:cNvPr>
+          <p:cNvSpPr>
+            <a:spLocks noGrp="1"/>
+          </p:cNvSpPr>
+          <p:nvPr>
+            <p:ph type="dt" sz="half" idx="10"/>
+          </p:nvPr>
+        </p:nvSpPr>
+        <p:spPr>
+          <a:xfrm>
+            <a:off x="1097280" y="6459785"/>
+            <a:ext cx="2472271" cy="365125"/>
+          </a:xfrm>
+        </p:spPr>
+        <p:txBody>
+          <a:bodyPr>
+            <a:normAutofit/>
+          </a:bodyPr>
+          <a:lstStyle/>
+          <a:p>
+            <a:pPr>
+              <a:spcAft>
+                <a:spcPts val="600"/>
+              </a:spcAft>
+            </a:pPr>
+            <a:r>
+              <a:rPr lang="en-US"/>
+              <a:t>16 August 2025</a:t>
+            </a:r>
+          </a:p>
+        </p:txBody>
+      </p:sp>
+      <p:sp>
+        <p:nvSpPr>
+          <p:cNvPr id="13" name="Footer Placeholder 5">
+            <a:extLst>
+              <a:ext uri="{FF2B5EF4-FFF2-40B4-BE49-F238E27FC236}">
+                <a16:creationId xmlns:a16="http://schemas.microsoft.com/office/drawing/2014/main" id="{0E9ABC5F-2E62-43BA-33E0-090E628707E8}"/>
+              </a:ext>
+            </a:extLst>
+          </p:cNvPr>
+          <p:cNvSpPr>
+            <a:spLocks noGrp="1"/>
+          </p:cNvSpPr>
+          <p:nvPr>
+            <p:ph type="ftr" sz="quarter" idx="11"/>
+          </p:nvPr>
+        </p:nvSpPr>
+        <p:spPr>
+          <a:xfrm>
+            <a:off x="3686185" y="6459785"/>
+            <a:ext cx="4822804" cy="365125"/>
+          </a:xfrm>
+        </p:spPr>
+        <p:txBody>
+          <a:bodyPr>
+            <a:normAutofit/>
+          </a:bodyPr>
+          <a:lstStyle/>
+          <a:p>
+            <a:pPr>
+              <a:spcAft>
+                <a:spcPts val="600"/>
+              </a:spcAft>
+            </a:pPr>
+            <a:r>
+              <a:rPr lang="en-US"/>
+              <a:t>BSides Bournemouth 2025</a:t>
+            </a:r>
+          </a:p>
+        </p:txBody>
+      </p:sp>
+      <p:sp>
+        <p:nvSpPr>
+          <p:cNvPr id="7" name="Slide Number Placeholder 6">
+            <a:extLst>
+              <a:ext uri="{FF2B5EF4-FFF2-40B4-BE49-F238E27FC236}">
+                <a16:creationId xmlns:a16="http://schemas.microsoft.com/office/drawing/2014/main" id="{F506F1CD-72F8-1476-CD8F-FC68DDD4B04B}"/>
+              </a:ext>
+            </a:extLst>
+          </p:cNvPr>
+          <p:cNvSpPr>
+            <a:spLocks noGrp="1"/>
+          </p:cNvSpPr>
+          <p:nvPr>
+            <p:ph type="sldNum" sz="quarter" idx="12"/>
+          </p:nvPr>
+        </p:nvSpPr>
+        <p:spPr>
+          <a:xfrm>
+            <a:off x="9900458" y="6459785"/>
+            <a:ext cx="1312025" cy="365125"/>
+          </a:xfrm>
+        </p:spPr>
+        <p:txBody>
+          <a:bodyPr>
+            <a:normAutofit/>
+          </a:bodyPr>
+          <a:lstStyle/>
+          <a:p>
+            <a:pPr>
+              <a:spcAft>
+                <a:spcPts val="600"/>
+              </a:spcAft>
+            </a:pPr>
+            <a:fld id="{A65A5C87-DF58-40C8-B092-1DE63DB4547E}" type="slidenum">
+              <a:rPr lang="en-US"/>
+              <a:pPr>
+                <a:spcAft>
+                  <a:spcPts val="600"/>
+                </a:spcAft>
+              </a:pPr>
+              <a:t>21</a:t>
+            </a:fld>
+            <a:endParaRPr lang="en-US"/>
+          </a:p>
+        </p:txBody>
+      </p:sp>
+      <p:graphicFrame>
+        <p:nvGraphicFramePr>
+          <p:cNvPr id="15" name="Content Placeholder 5">
+            <a:extLst>
+              <a:ext uri="{FF2B5EF4-FFF2-40B4-BE49-F238E27FC236}">
+                <a16:creationId xmlns:a16="http://schemas.microsoft.com/office/drawing/2014/main" id="{6F5A690E-0C0D-FA1D-C6B6-10A107748D28}"/>
+              </a:ext>
+            </a:extLst>
+          </p:cNvPr>
+          <p:cNvGraphicFramePr>
+            <a:graphicFrameLocks noGrp="1"/>
+          </p:cNvGraphicFramePr>
+          <p:nvPr>
+            <p:ph idx="1"/>
+            <p:extLst>
+              <p:ext uri="{D42A27DB-BD31-4B8C-83A1-F6EECF244321}">
+                <p14:modId xmlns:p14="http://schemas.microsoft.com/office/powerpoint/2010/main" val="1280027354"/>
+              </p:ext>
+            </p:extLst>
+          </p:nvPr>
+        </p:nvGraphicFramePr>
+        <p:xfrm>
+          <a:off x="306888" y="1052186"/>
+          <a:ext cx="11580311" cy="3068877"/>
+        </p:xfrm>
+        <a:graphic>
+          <a:graphicData uri="http://schemas.openxmlformats.org/drawingml/2006/diagram">
+            <dgm:relIds xmlns:dgm="http://schemas.openxmlformats.org/drawingml/2006/diagram" xmlns:r="http://schemas.openxmlformats.org/officeDocument/2006/relationships" r:dm="rId3" r:lo="rId4" r:qs="rId5" r:cs="rId6"/>
+          </a:graphicData>
+        </a:graphic>
+      </p:graphicFrame>
+    </p:spTree>
+    <p:extLst>
+      <p:ext uri="{BB962C8B-B14F-4D97-AF65-F5344CB8AC3E}">
+        <p14:creationId xmlns:p14="http://schemas.microsoft.com/office/powerpoint/2010/main" val="4287369654"/>
+      </p:ext>
+    </p:extLst>
+  </p:cSld>
+  <p:clrMapOvr>
+    <a:masterClrMapping/>
+  </p:clrMapOvr>
+</p:sld>
+</file>
+
+<file path=ppt/slides/slide22.xml><?xml version="1.0" encoding="utf-8"?>
+<p:sld xmlns:a="http://schemas.openxmlformats.org/drawingml/2006/main" xmlns:r="http://schemas.openxmlformats.org/officeDocument/2006/relationships" xmlns:p="http://schemas.openxmlformats.org/presentationml/2006/main">
+  <p:cSld>
     <p:spTree>
       <p:nvGrpSpPr>
         <p:cNvPr id="1" name=""/>
@@ -40618,7 +43253,7 @@
           <a:p>
             <a:fld id="{A65A5C87-DF58-40C8-B092-1DE63DB4547E}" type="slidenum">
               <a:rPr lang="en-US" smtClean="0"/>
-              <a:t>20</a:t>
+              <a:t>22</a:t>
             </a:fld>
             <a:endParaRPr lang="en-US"/>
           </a:p>
@@ -44289,15 +46924,6 @@
 </file>
 
 <file path=customXml/item1.xml><?xml version="1.0" encoding="utf-8"?>
-<?mso-contentType ?>
-<FormTemplates xmlns="http://schemas.microsoft.com/sharepoint/v3/contenttype/forms">
-  <Display>DocumentLibraryForm</Display>
-  <Edit>DocumentLibraryForm</Edit>
-  <New>DocumentLibraryForm</New>
-</FormTemplates>
-</file>
-
-<file path=customXml/item2.xml><?xml version="1.0" encoding="utf-8"?>
 <ct:contentTypeSchema xmlns:ct="http://schemas.microsoft.com/office/2006/metadata/contentType" xmlns:ma="http://schemas.microsoft.com/office/2006/metadata/properties/metaAttributes" ct:_="" ma:_="" ma:contentTypeName="Document" ma:contentTypeID="0x010100BB85A37B4CED78498430FD40E0476C2F" ma:contentTypeVersion="4" ma:contentTypeDescription="Create a new document." ma:contentTypeScope="" ma:versionID="ac6abf3981073ba46141dd1e4b76e8c1">
   <xsd:schema xmlns:xsd="http://www.w3.org/2001/XMLSchema" xmlns:xs="http://www.w3.org/2001/XMLSchema" xmlns:p="http://schemas.microsoft.com/office/2006/metadata/properties" xmlns:ns2="3dff2cb0-b59f-4ba5-8026-f46ed5c30e5a" targetNamespace="http://schemas.microsoft.com/office/2006/metadata/properties" ma:root="true" ma:fieldsID="41963d5612ba24b0f85bc6add60a0e6b" ns2:_="">
     <xsd:import namespace="3dff2cb0-b59f-4ba5-8026-f46ed5c30e5a"/>
@@ -44441,15 +47067,16 @@
 </ct:contentTypeSchema>
 </file>
 
-<file path=customXml/itemProps1.xml><?xml version="1.0" encoding="utf-8"?>
-<ds:datastoreItem xmlns:ds="http://schemas.openxmlformats.org/officeDocument/2006/customXml" ds:itemID="{06A1526B-405D-40CB-A948-01AB4F8C4DE9}">
-  <ds:schemaRefs>
-    <ds:schemaRef ds:uri="http://schemas.microsoft.com/sharepoint/v3/contenttype/forms"/>
-  </ds:schemaRefs>
-</ds:datastoreItem>
+<file path=customXml/item2.xml><?xml version="1.0" encoding="utf-8"?>
+<?mso-contentType ?>
+<FormTemplates xmlns="http://schemas.microsoft.com/sharepoint/v3/contenttype/forms">
+  <Display>DocumentLibraryForm</Display>
+  <Edit>DocumentLibraryForm</Edit>
+  <New>DocumentLibraryForm</New>
+</FormTemplates>
 </file>
 
-<file path=customXml/itemProps2.xml><?xml version="1.0" encoding="utf-8"?>
+<file path=customXml/itemProps1.xml><?xml version="1.0" encoding="utf-8"?>
 <ds:datastoreItem xmlns:ds="http://schemas.openxmlformats.org/officeDocument/2006/customXml" ds:itemID="{E7BCE3FC-015E-45D8-9BE8-DF91BDB033B0}">
   <ds:schemaRefs>
     <ds:schemaRef ds:uri="3dff2cb0-b59f-4ba5-8026-f46ed5c30e5a"/>
@@ -44465,4 +47092,12 @@
     <ds:schemaRef ds:uri="http://www.w3.org/2001/XMLSchema"/>
   </ds:schemaRefs>
 </ds:datastoreItem>
+</file>
+
+<file path=customXml/itemProps2.xml><?xml version="1.0" encoding="utf-8"?>
+<ds:datastoreItem xmlns:ds="http://schemas.openxmlformats.org/officeDocument/2006/customXml" ds:itemID="{06A1526B-405D-40CB-A948-01AB4F8C4DE9}">
+  <ds:schemaRefs>
+    <ds:schemaRef ds:uri="http://schemas.microsoft.com/sharepoint/v3/contenttype/forms"/>
+  </ds:schemaRefs>
+</ds:datastoreItem>
 </file>
</xml_diff>